<commit_message>
Fixed a small typo in the raw data and did posthoc analyses for female experiment for number of inseminations.
</commit_message>
<xml_diff>
--- a/soc_exp_ms_figs.pptx
+++ b/soc_exp_ms_figs.pptx
@@ -273,7 +273,7 @@
           <a:p>
             <a:fld id="{65368BD6-7643-4418-A51B-0F021EBB43CE}" type="datetimeFigureOut">
               <a:rPr lang="en-CA" smtClean="0"/>
-              <a:t>2024-02-10</a:t>
+              <a:t>2024-02-12</a:t>
             </a:fld>
             <a:endParaRPr lang="en-CA"/>
           </a:p>
@@ -473,7 +473,7 @@
           <a:p>
             <a:fld id="{65368BD6-7643-4418-A51B-0F021EBB43CE}" type="datetimeFigureOut">
               <a:rPr lang="en-CA" smtClean="0"/>
-              <a:t>2024-02-10</a:t>
+              <a:t>2024-02-12</a:t>
             </a:fld>
             <a:endParaRPr lang="en-CA"/>
           </a:p>
@@ -683,7 +683,7 @@
           <a:p>
             <a:fld id="{65368BD6-7643-4418-A51B-0F021EBB43CE}" type="datetimeFigureOut">
               <a:rPr lang="en-CA" smtClean="0"/>
-              <a:t>2024-02-10</a:t>
+              <a:t>2024-02-12</a:t>
             </a:fld>
             <a:endParaRPr lang="en-CA"/>
           </a:p>
@@ -883,7 +883,7 @@
           <a:p>
             <a:fld id="{65368BD6-7643-4418-A51B-0F021EBB43CE}" type="datetimeFigureOut">
               <a:rPr lang="en-CA" smtClean="0"/>
-              <a:t>2024-02-10</a:t>
+              <a:t>2024-02-12</a:t>
             </a:fld>
             <a:endParaRPr lang="en-CA"/>
           </a:p>
@@ -1159,7 +1159,7 @@
           <a:p>
             <a:fld id="{65368BD6-7643-4418-A51B-0F021EBB43CE}" type="datetimeFigureOut">
               <a:rPr lang="en-CA" smtClean="0"/>
-              <a:t>2024-02-10</a:t>
+              <a:t>2024-02-12</a:t>
             </a:fld>
             <a:endParaRPr lang="en-CA"/>
           </a:p>
@@ -1427,7 +1427,7 @@
           <a:p>
             <a:fld id="{65368BD6-7643-4418-A51B-0F021EBB43CE}" type="datetimeFigureOut">
               <a:rPr lang="en-CA" smtClean="0"/>
-              <a:t>2024-02-10</a:t>
+              <a:t>2024-02-12</a:t>
             </a:fld>
             <a:endParaRPr lang="en-CA"/>
           </a:p>
@@ -1842,7 +1842,7 @@
           <a:p>
             <a:fld id="{65368BD6-7643-4418-A51B-0F021EBB43CE}" type="datetimeFigureOut">
               <a:rPr lang="en-CA" smtClean="0"/>
-              <a:t>2024-02-10</a:t>
+              <a:t>2024-02-12</a:t>
             </a:fld>
             <a:endParaRPr lang="en-CA"/>
           </a:p>
@@ -1984,7 +1984,7 @@
           <a:p>
             <a:fld id="{65368BD6-7643-4418-A51B-0F021EBB43CE}" type="datetimeFigureOut">
               <a:rPr lang="en-CA" smtClean="0"/>
-              <a:t>2024-02-10</a:t>
+              <a:t>2024-02-12</a:t>
             </a:fld>
             <a:endParaRPr lang="en-CA"/>
           </a:p>
@@ -2097,7 +2097,7 @@
           <a:p>
             <a:fld id="{65368BD6-7643-4418-A51B-0F021EBB43CE}" type="datetimeFigureOut">
               <a:rPr lang="en-CA" smtClean="0"/>
-              <a:t>2024-02-10</a:t>
+              <a:t>2024-02-12</a:t>
             </a:fld>
             <a:endParaRPr lang="en-CA"/>
           </a:p>
@@ -2410,7 +2410,7 @@
           <a:p>
             <a:fld id="{65368BD6-7643-4418-A51B-0F021EBB43CE}" type="datetimeFigureOut">
               <a:rPr lang="en-CA" smtClean="0"/>
-              <a:t>2024-02-10</a:t>
+              <a:t>2024-02-12</a:t>
             </a:fld>
             <a:endParaRPr lang="en-CA"/>
           </a:p>
@@ -2699,7 +2699,7 @@
           <a:p>
             <a:fld id="{65368BD6-7643-4418-A51B-0F021EBB43CE}" type="datetimeFigureOut">
               <a:rPr lang="en-CA" smtClean="0"/>
-              <a:t>2024-02-10</a:t>
+              <a:t>2024-02-12</a:t>
             </a:fld>
             <a:endParaRPr lang="en-CA"/>
           </a:p>
@@ -2942,7 +2942,7 @@
           <a:p>
             <a:fld id="{65368BD6-7643-4418-A51B-0F021EBB43CE}" type="datetimeFigureOut">
               <a:rPr lang="en-CA" smtClean="0"/>
-              <a:t>2024-02-10</a:t>
+              <a:t>2024-02-12</a:t>
             </a:fld>
             <a:endParaRPr lang="en-CA"/>
           </a:p>
@@ -3525,7 +3525,7 @@
         </p:blipFill>
         <p:spPr>
           <a:xfrm>
-            <a:off x="2293395" y="837116"/>
+            <a:off x="2293395" y="689864"/>
             <a:ext cx="3507041" cy="2615959"/>
           </a:xfrm>
           <a:prstGeom prst="rect">
@@ -3555,8 +3555,98 @@
         </p:blipFill>
         <p:spPr>
           <a:xfrm>
-            <a:off x="6269535" y="899180"/>
+            <a:off x="6269535" y="643561"/>
             <a:ext cx="3611419" cy="2708564"/>
+          </a:xfrm>
+          <a:prstGeom prst="rect">
+            <a:avLst/>
+          </a:prstGeom>
+        </p:spPr>
+      </p:pic>
+      <p:pic>
+        <p:nvPicPr>
+          <p:cNvPr id="2" name="Picture 1">
+            <a:extLst>
+              <a:ext uri="{FF2B5EF4-FFF2-40B4-BE49-F238E27FC236}">
+                <a16:creationId xmlns:a16="http://schemas.microsoft.com/office/drawing/2014/main" id="{4AD02480-1BDF-9C20-D284-E28CF7BE5D98}"/>
+              </a:ext>
+            </a:extLst>
+          </p:cNvPr>
+          <p:cNvPicPr>
+            <a:picLocks noChangeAspect="1"/>
+          </p:cNvPicPr>
+          <p:nvPr/>
+        </p:nvPicPr>
+        <p:blipFill>
+          <a:blip r:embed="rId6"/>
+          <a:stretch>
+            <a:fillRect/>
+          </a:stretch>
+        </p:blipFill>
+        <p:spPr>
+          <a:xfrm>
+            <a:off x="4111570" y="1890653"/>
+            <a:ext cx="599586" cy="214380"/>
+          </a:xfrm>
+          <a:prstGeom prst="rect">
+            <a:avLst/>
+          </a:prstGeom>
+        </p:spPr>
+      </p:pic>
+      <p:pic>
+        <p:nvPicPr>
+          <p:cNvPr id="4" name="Picture 3">
+            <a:extLst>
+              <a:ext uri="{FF2B5EF4-FFF2-40B4-BE49-F238E27FC236}">
+                <a16:creationId xmlns:a16="http://schemas.microsoft.com/office/drawing/2014/main" id="{7626AE49-EA98-116C-4991-DC8BE34F0908}"/>
+              </a:ext>
+            </a:extLst>
+          </p:cNvPr>
+          <p:cNvPicPr>
+            <a:picLocks noChangeAspect="1"/>
+          </p:cNvPicPr>
+          <p:nvPr/>
+        </p:nvPicPr>
+        <p:blipFill>
+          <a:blip r:embed="rId6"/>
+          <a:stretch>
+            <a:fillRect/>
+          </a:stretch>
+        </p:blipFill>
+        <p:spPr>
+          <a:xfrm>
+            <a:off x="8122956" y="2018262"/>
+            <a:ext cx="599586" cy="214380"/>
+          </a:xfrm>
+          <a:prstGeom prst="rect">
+            <a:avLst/>
+          </a:prstGeom>
+        </p:spPr>
+      </p:pic>
+      <p:pic>
+        <p:nvPicPr>
+          <p:cNvPr id="6" name="Picture 5">
+            <a:extLst>
+              <a:ext uri="{FF2B5EF4-FFF2-40B4-BE49-F238E27FC236}">
+                <a16:creationId xmlns:a16="http://schemas.microsoft.com/office/drawing/2014/main" id="{FBBC9004-2829-8D90-7D3E-3876A5C059E6}"/>
+              </a:ext>
+            </a:extLst>
+          </p:cNvPr>
+          <p:cNvPicPr>
+            <a:picLocks noChangeAspect="1"/>
+          </p:cNvPicPr>
+          <p:nvPr/>
+        </p:nvPicPr>
+        <p:blipFill>
+          <a:blip r:embed="rId6"/>
+          <a:stretch>
+            <a:fillRect/>
+          </a:stretch>
+        </p:blipFill>
+        <p:spPr>
+          <a:xfrm>
+            <a:off x="8075244" y="4682523"/>
+            <a:ext cx="599586" cy="214380"/>
           </a:xfrm>
           <a:prstGeom prst="rect">
             <a:avLst/>

</xml_diff>

<commit_message>
Halfway through updating figs; just pushing so that I can work on it from my laptop
</commit_message>
<xml_diff>
--- a/soc_exp_ms_figs.pptx
+++ b/soc_exp_ms_figs.pptx
@@ -11241,6 +11241,36 @@
       </p:pic>
       <p:pic>
         <p:nvPicPr>
+          <p:cNvPr id="10" name="Picture 9">
+            <a:extLst>
+              <a:ext uri="{FF2B5EF4-FFF2-40B4-BE49-F238E27FC236}">
+                <a16:creationId xmlns:a16="http://schemas.microsoft.com/office/drawing/2014/main" id="{18AEFB30-FC8C-BA65-4BD6-8DA228C2A848}"/>
+              </a:ext>
+            </a:extLst>
+          </p:cNvPr>
+          <p:cNvPicPr>
+            <a:picLocks noChangeAspect="1"/>
+          </p:cNvPicPr>
+          <p:nvPr/>
+        </p:nvPicPr>
+        <p:blipFill>
+          <a:blip r:embed="rId7"/>
+          <a:stretch>
+            <a:fillRect/>
+          </a:stretch>
+        </p:blipFill>
+        <p:spPr>
+          <a:xfrm>
+            <a:off x="8126084" y="330303"/>
+            <a:ext cx="2419835" cy="2928462"/>
+          </a:xfrm>
+          <a:prstGeom prst="rect">
+            <a:avLst/>
+          </a:prstGeom>
+        </p:spPr>
+      </p:pic>
+      <p:pic>
+        <p:nvPicPr>
           <p:cNvPr id="47" name="Picture 46">
             <a:extLst>
               <a:ext uri="{FF2B5EF4-FFF2-40B4-BE49-F238E27FC236}">
@@ -11269,104 +11299,6 @@
           </a:prstGeom>
         </p:spPr>
       </p:pic>
-      <p:pic>
-        <p:nvPicPr>
-          <p:cNvPr id="49" name="Picture 48">
-            <a:extLst>
-              <a:ext uri="{FF2B5EF4-FFF2-40B4-BE49-F238E27FC236}">
-                <a16:creationId xmlns:a16="http://schemas.microsoft.com/office/drawing/2014/main" id="{D37E4A4B-0C59-86C0-2D65-822816D36AEB}"/>
-              </a:ext>
-            </a:extLst>
-          </p:cNvPr>
-          <p:cNvPicPr>
-            <a:picLocks noChangeAspect="1"/>
-          </p:cNvPicPr>
-          <p:nvPr/>
-        </p:nvPicPr>
-        <p:blipFill>
-          <a:blip r:embed="rId7"/>
-          <a:stretch>
-            <a:fillRect/>
-          </a:stretch>
-        </p:blipFill>
-        <p:spPr>
-          <a:xfrm>
-            <a:off x="8093337" y="410533"/>
-            <a:ext cx="2666318" cy="3024321"/>
-          </a:xfrm>
-          <a:prstGeom prst="rect">
-            <a:avLst/>
-          </a:prstGeom>
-        </p:spPr>
-      </p:pic>
-      <p:pic>
-        <p:nvPicPr>
-          <p:cNvPr id="16" name="Picture 15">
-            <a:extLst>
-              <a:ext uri="{FF2B5EF4-FFF2-40B4-BE49-F238E27FC236}">
-                <a16:creationId xmlns:a16="http://schemas.microsoft.com/office/drawing/2014/main" id="{54FA16E7-708D-C09A-7088-1249F972D8CA}"/>
-              </a:ext>
-            </a:extLst>
-          </p:cNvPr>
-          <p:cNvPicPr>
-            <a:picLocks noChangeAspect="1"/>
-          </p:cNvPicPr>
-          <p:nvPr/>
-        </p:nvPicPr>
-        <p:blipFill>
-          <a:blip r:embed="rId8"/>
-          <a:stretch>
-            <a:fillRect/>
-          </a:stretch>
-        </p:blipFill>
-        <p:spPr>
-          <a:xfrm>
-            <a:off x="9012084" y="258363"/>
-            <a:ext cx="1240977" cy="257211"/>
-          </a:xfrm>
-          <a:prstGeom prst="rect">
-            <a:avLst/>
-          </a:prstGeom>
-        </p:spPr>
-      </p:pic>
-      <p:sp>
-        <p:nvSpPr>
-          <p:cNvPr id="17" name="TextBox 16">
-            <a:extLst>
-              <a:ext uri="{FF2B5EF4-FFF2-40B4-BE49-F238E27FC236}">
-                <a16:creationId xmlns:a16="http://schemas.microsoft.com/office/drawing/2014/main" id="{F8D542A9-4441-1D86-28B7-9C2A3D2B0336}"/>
-              </a:ext>
-            </a:extLst>
-          </p:cNvPr>
-          <p:cNvSpPr txBox="1"/>
-          <p:nvPr/>
-        </p:nvSpPr>
-        <p:spPr>
-          <a:xfrm>
-            <a:off x="9426496" y="109499"/>
-            <a:ext cx="445520" cy="307777"/>
-          </a:xfrm>
-          <a:prstGeom prst="rect">
-            <a:avLst/>
-          </a:prstGeom>
-          <a:noFill/>
-        </p:spPr>
-        <p:txBody>
-          <a:bodyPr wrap="square" rtlCol="0">
-            <a:spAutoFit/>
-          </a:bodyPr>
-          <a:lstStyle/>
-          <a:p>
-            <a:r>
-              <a:rPr lang="en-CA" sz="1400" b="1" dirty="0">
-                <a:latin typeface="Helvetica" panose="020B0604020202020204" pitchFamily="34" charset="0"/>
-                <a:cs typeface="Helvetica" panose="020B0604020202020204" pitchFamily="34" charset="0"/>
-              </a:rPr>
-              <a:t>**</a:t>
-            </a:r>
-          </a:p>
-        </p:txBody>
-      </p:sp>
       <p:sp>
         <p:nvSpPr>
           <p:cNvPr id="6" name="TextBox 5">
@@ -11446,7 +11378,7 @@
             <p:nvPr/>
           </p:nvPicPr>
           <p:blipFill>
-            <a:blip r:embed="rId9"/>
+            <a:blip r:embed="rId8"/>
             <a:stretch>
               <a:fillRect/>
             </a:stretch>
@@ -11492,6 +11424,82 @@
           </p:spPr>
         </p:pic>
       </p:grpSp>
+      <p:sp>
+        <p:nvSpPr>
+          <p:cNvPr id="7" name="TextBox 6">
+            <a:extLst>
+              <a:ext uri="{FF2B5EF4-FFF2-40B4-BE49-F238E27FC236}">
+                <a16:creationId xmlns:a16="http://schemas.microsoft.com/office/drawing/2014/main" id="{AC8B670A-3292-8329-FFDE-FE848A4B98A1}"/>
+              </a:ext>
+            </a:extLst>
+          </p:cNvPr>
+          <p:cNvSpPr txBox="1"/>
+          <p:nvPr/>
+        </p:nvSpPr>
+        <p:spPr>
+          <a:xfrm>
+            <a:off x="8736987" y="3239169"/>
+            <a:ext cx="722725" cy="307777"/>
+          </a:xfrm>
+          <a:prstGeom prst="rect">
+            <a:avLst/>
+          </a:prstGeom>
+          <a:noFill/>
+        </p:spPr>
+        <p:txBody>
+          <a:bodyPr wrap="square" rtlCol="0">
+            <a:spAutoFit/>
+          </a:bodyPr>
+          <a:lstStyle/>
+          <a:p>
+            <a:r>
+              <a:rPr lang="en-CA" sz="1400" dirty="0">
+                <a:latin typeface="Helvetica" panose="020B0604020202020204" pitchFamily="34" charset="0"/>
+                <a:cs typeface="Helvetica" panose="020B0604020202020204" pitchFamily="34" charset="0"/>
+              </a:rPr>
+              <a:t>Day 1</a:t>
+            </a:r>
+          </a:p>
+        </p:txBody>
+      </p:sp>
+      <p:sp>
+        <p:nvSpPr>
+          <p:cNvPr id="8" name="TextBox 7">
+            <a:extLst>
+              <a:ext uri="{FF2B5EF4-FFF2-40B4-BE49-F238E27FC236}">
+                <a16:creationId xmlns:a16="http://schemas.microsoft.com/office/drawing/2014/main" id="{184BF9B5-46EE-B59E-C9A4-2E569F5BD893}"/>
+              </a:ext>
+            </a:extLst>
+          </p:cNvPr>
+          <p:cNvSpPr txBox="1"/>
+          <p:nvPr/>
+        </p:nvSpPr>
+        <p:spPr>
+          <a:xfrm>
+            <a:off x="9634920" y="3240657"/>
+            <a:ext cx="722725" cy="307777"/>
+          </a:xfrm>
+          <a:prstGeom prst="rect">
+            <a:avLst/>
+          </a:prstGeom>
+          <a:noFill/>
+        </p:spPr>
+        <p:txBody>
+          <a:bodyPr wrap="square" rtlCol="0">
+            <a:spAutoFit/>
+          </a:bodyPr>
+          <a:lstStyle/>
+          <a:p>
+            <a:r>
+              <a:rPr lang="en-CA" sz="1400" dirty="0">
+                <a:latin typeface="Helvetica" panose="020B0604020202020204" pitchFamily="34" charset="0"/>
+                <a:cs typeface="Helvetica" panose="020B0604020202020204" pitchFamily="34" charset="0"/>
+              </a:rPr>
+              <a:t>Day 2</a:t>
+            </a:r>
+          </a:p>
+        </p:txBody>
+      </p:sp>
     </p:spTree>
     <p:extLst>
       <p:ext uri="{BB962C8B-B14F-4D97-AF65-F5344CB8AC3E}">
@@ -11554,10 +11562,10 @@
       </p:pic>
       <p:pic>
         <p:nvPicPr>
-          <p:cNvPr id="9" name="Picture 8">
-            <a:extLst>
-              <a:ext uri="{FF2B5EF4-FFF2-40B4-BE49-F238E27FC236}">
-                <a16:creationId xmlns:a16="http://schemas.microsoft.com/office/drawing/2014/main" id="{A7B77F48-1DD8-0AD4-079C-EB649C4D111B}"/>
+          <p:cNvPr id="7" name="Picture 6">
+            <a:extLst>
+              <a:ext uri="{FF2B5EF4-FFF2-40B4-BE49-F238E27FC236}">
+                <a16:creationId xmlns:a16="http://schemas.microsoft.com/office/drawing/2014/main" id="{092DC6FB-70E5-4184-68C2-5DAE04555E98}"/>
               </a:ext>
             </a:extLst>
           </p:cNvPr>
@@ -11574,8 +11582,8 @@
         </p:blipFill>
         <p:spPr>
           <a:xfrm>
-            <a:off x="7355827" y="363022"/>
-            <a:ext cx="2547230" cy="3063837"/>
+            <a:off x="4590478" y="362490"/>
+            <a:ext cx="2547230" cy="3082148"/>
           </a:xfrm>
           <a:prstGeom prst="rect">
             <a:avLst/>
@@ -11584,10 +11592,10 @@
       </p:pic>
       <p:pic>
         <p:nvPicPr>
-          <p:cNvPr id="7" name="Picture 6">
-            <a:extLst>
-              <a:ext uri="{FF2B5EF4-FFF2-40B4-BE49-F238E27FC236}">
-                <a16:creationId xmlns:a16="http://schemas.microsoft.com/office/drawing/2014/main" id="{092DC6FB-70E5-4184-68C2-5DAE04555E98}"/>
+          <p:cNvPr id="5" name="Picture 4">
+            <a:extLst>
+              <a:ext uri="{FF2B5EF4-FFF2-40B4-BE49-F238E27FC236}">
+                <a16:creationId xmlns:a16="http://schemas.microsoft.com/office/drawing/2014/main" id="{3BDE8ED0-6AD0-1E37-B936-3B0C5F688003}"/>
               </a:ext>
             </a:extLst>
           </p:cNvPr>
@@ -11598,36 +11606,6 @@
         </p:nvPicPr>
         <p:blipFill>
           <a:blip r:embed="rId4"/>
-          <a:stretch>
-            <a:fillRect/>
-          </a:stretch>
-        </p:blipFill>
-        <p:spPr>
-          <a:xfrm>
-            <a:off x="4590478" y="362490"/>
-            <a:ext cx="2547230" cy="3082148"/>
-          </a:xfrm>
-          <a:prstGeom prst="rect">
-            <a:avLst/>
-          </a:prstGeom>
-        </p:spPr>
-      </p:pic>
-      <p:pic>
-        <p:nvPicPr>
-          <p:cNvPr id="5" name="Picture 4">
-            <a:extLst>
-              <a:ext uri="{FF2B5EF4-FFF2-40B4-BE49-F238E27FC236}">
-                <a16:creationId xmlns:a16="http://schemas.microsoft.com/office/drawing/2014/main" id="{3BDE8ED0-6AD0-1E37-B936-3B0C5F688003}"/>
-              </a:ext>
-            </a:extLst>
-          </p:cNvPr>
-          <p:cNvPicPr>
-            <a:picLocks noChangeAspect="1"/>
-          </p:cNvPicPr>
-          <p:nvPr/>
-        </p:nvPicPr>
-        <p:blipFill>
-          <a:blip r:embed="rId5"/>
           <a:stretch>
             <a:fillRect/>
           </a:stretch>
@@ -11983,7 +11961,7 @@
             <p:nvPr/>
           </p:nvPicPr>
           <p:blipFill rotWithShape="1">
-            <a:blip r:embed="rId6"/>
+            <a:blip r:embed="rId5"/>
             <a:srcRect l="3021" t="1714" r="3955" b="1896"/>
             <a:stretch/>
           </p:blipFill>
@@ -12012,7 +11990,7 @@
             <p:nvPr/>
           </p:nvPicPr>
           <p:blipFill>
-            <a:blip r:embed="rId7"/>
+            <a:blip r:embed="rId6"/>
             <a:stretch>
               <a:fillRect/>
             </a:stretch>
@@ -12116,6 +12094,35 @@
           </a:p>
         </p:txBody>
       </p:sp>
+      <p:pic>
+        <p:nvPicPr>
+          <p:cNvPr id="10" name="Picture 9">
+            <a:extLst>
+              <a:ext uri="{FF2B5EF4-FFF2-40B4-BE49-F238E27FC236}">
+                <a16:creationId xmlns:a16="http://schemas.microsoft.com/office/drawing/2014/main" id="{DDB69BEA-FDDB-76A0-2B2E-AA83990F51ED}"/>
+              </a:ext>
+            </a:extLst>
+          </p:cNvPr>
+          <p:cNvPicPr>
+            <a:picLocks noChangeAspect="1"/>
+          </p:cNvPicPr>
+          <p:nvPr/>
+        </p:nvPicPr>
+        <p:blipFill rotWithShape="1">
+          <a:blip r:embed="rId7"/>
+          <a:srcRect b="6319"/>
+          <a:stretch/>
+        </p:blipFill>
+        <p:spPr>
+          <a:xfrm>
+            <a:off x="7423749" y="299511"/>
+            <a:ext cx="2547230" cy="2932660"/>
+          </a:xfrm>
+          <a:prstGeom prst="rect">
+            <a:avLst/>
+          </a:prstGeom>
+        </p:spPr>
+      </p:pic>
       <p:sp>
         <p:nvSpPr>
           <p:cNvPr id="41" name="TextBox 40">
@@ -12250,10 +12257,10 @@
       </p:sp>
       <p:pic>
         <p:nvPicPr>
-          <p:cNvPr id="57" name="Picture 56">
-            <a:extLst>
-              <a:ext uri="{FF2B5EF4-FFF2-40B4-BE49-F238E27FC236}">
-                <a16:creationId xmlns:a16="http://schemas.microsoft.com/office/drawing/2014/main" id="{C885994B-5C8A-38EA-AA81-83C32E811CDE}"/>
+          <p:cNvPr id="3" name="Picture 2">
+            <a:extLst>
+              <a:ext uri="{FF2B5EF4-FFF2-40B4-BE49-F238E27FC236}">
+                <a16:creationId xmlns:a16="http://schemas.microsoft.com/office/drawing/2014/main" id="{1450EC57-4DF2-3EB6-9A32-DB5711DB7E87}"/>
               </a:ext>
             </a:extLst>
           </p:cNvPr>
@@ -12263,27 +12270,57 @@
           <p:nvPr/>
         </p:nvPicPr>
         <p:blipFill>
-          <a:blip r:embed="rId8"/>
+          <a:blip r:embed="rId6"/>
           <a:stretch>
             <a:fillRect/>
           </a:stretch>
         </p:blipFill>
         <p:spPr>
           <a:xfrm>
-            <a:off x="8272735" y="208988"/>
-            <a:ext cx="1228896" cy="209579"/>
+            <a:off x="2932090" y="3410414"/>
+            <a:ext cx="1260349" cy="375978"/>
           </a:xfrm>
           <a:prstGeom prst="rect">
             <a:avLst/>
           </a:prstGeom>
         </p:spPr>
       </p:pic>
+      <p:pic>
+        <p:nvPicPr>
+          <p:cNvPr id="2" name="Picture 1">
+            <a:extLst>
+              <a:ext uri="{FF2B5EF4-FFF2-40B4-BE49-F238E27FC236}">
+                <a16:creationId xmlns:a16="http://schemas.microsoft.com/office/drawing/2014/main" id="{34D0ADE3-95CB-1747-BA16-DC4D4E9A61DA}"/>
+              </a:ext>
+            </a:extLst>
+          </p:cNvPr>
+          <p:cNvPicPr>
+            <a:picLocks noChangeAspect="1"/>
+          </p:cNvPicPr>
+          <p:nvPr/>
+        </p:nvPicPr>
+        <p:blipFill>
+          <a:blip r:embed="rId6"/>
+          <a:stretch>
+            <a:fillRect/>
+          </a:stretch>
+        </p:blipFill>
+        <p:spPr>
+          <a:xfrm>
+            <a:off x="5633433" y="89650"/>
+            <a:ext cx="1049269" cy="369332"/>
+          </a:xfrm>
+          <a:prstGeom prst="rect">
+            <a:avLst/>
+          </a:prstGeom>
+        </p:spPr>
+      </p:pic>
       <p:sp>
         <p:nvSpPr>
-          <p:cNvPr id="58" name="TextBox 57">
-            <a:extLst>
-              <a:ext uri="{FF2B5EF4-FFF2-40B4-BE49-F238E27FC236}">
-                <a16:creationId xmlns:a16="http://schemas.microsoft.com/office/drawing/2014/main" id="{E0231A93-0781-1DD5-B58D-CBF2928A0194}"/>
+          <p:cNvPr id="12" name="TextBox 11">
+            <a:extLst>
+              <a:ext uri="{FF2B5EF4-FFF2-40B4-BE49-F238E27FC236}">
+                <a16:creationId xmlns:a16="http://schemas.microsoft.com/office/drawing/2014/main" id="{DE08EA00-4209-C164-77BC-FE8E5D482DE3}"/>
               </a:ext>
             </a:extLst>
           </p:cNvPr>
@@ -12292,8 +12329,8 @@
         </p:nvSpPr>
         <p:spPr>
           <a:xfrm>
-            <a:off x="8731909" y="36854"/>
-            <a:ext cx="379562" cy="307777"/>
+            <a:off x="8074124" y="3197140"/>
+            <a:ext cx="722725" cy="307777"/>
           </a:xfrm>
           <a:prstGeom prst="rect">
             <a:avLst/>
@@ -12307,75 +12344,53 @@
           <a:lstStyle/>
           <a:p>
             <a:r>
-              <a:rPr lang="en-CA" sz="1400" b="1" dirty="0">
+              <a:rPr lang="en-CA" sz="1400" dirty="0">
                 <a:latin typeface="Helvetica" panose="020B0604020202020204" pitchFamily="34" charset="0"/>
                 <a:cs typeface="Helvetica" panose="020B0604020202020204" pitchFamily="34" charset="0"/>
               </a:rPr>
-              <a:t>*</a:t>
+              <a:t>Day 1</a:t>
             </a:r>
           </a:p>
         </p:txBody>
       </p:sp>
-      <p:pic>
-        <p:nvPicPr>
-          <p:cNvPr id="3" name="Picture 2">
-            <a:extLst>
-              <a:ext uri="{FF2B5EF4-FFF2-40B4-BE49-F238E27FC236}">
-                <a16:creationId xmlns:a16="http://schemas.microsoft.com/office/drawing/2014/main" id="{1450EC57-4DF2-3EB6-9A32-DB5711DB7E87}"/>
-              </a:ext>
-            </a:extLst>
-          </p:cNvPr>
-          <p:cNvPicPr>
-            <a:picLocks noChangeAspect="1"/>
-          </p:cNvPicPr>
+      <p:sp>
+        <p:nvSpPr>
+          <p:cNvPr id="13" name="TextBox 12">
+            <a:extLst>
+              <a:ext uri="{FF2B5EF4-FFF2-40B4-BE49-F238E27FC236}">
+                <a16:creationId xmlns:a16="http://schemas.microsoft.com/office/drawing/2014/main" id="{63BDC896-D42C-7AE5-9452-ED2D740BC987}"/>
+              </a:ext>
+            </a:extLst>
+          </p:cNvPr>
+          <p:cNvSpPr txBox="1"/>
           <p:nvPr/>
-        </p:nvPicPr>
-        <p:blipFill>
-          <a:blip r:embed="rId7"/>
-          <a:stretch>
-            <a:fillRect/>
-          </a:stretch>
-        </p:blipFill>
-        <p:spPr>
-          <a:xfrm>
-            <a:off x="2932090" y="3410414"/>
-            <a:ext cx="1260349" cy="375978"/>
+        </p:nvSpPr>
+        <p:spPr>
+          <a:xfrm>
+            <a:off x="9017552" y="3206265"/>
+            <a:ext cx="722725" cy="307777"/>
           </a:xfrm>
           <a:prstGeom prst="rect">
             <a:avLst/>
           </a:prstGeom>
-        </p:spPr>
-      </p:pic>
-      <p:pic>
-        <p:nvPicPr>
-          <p:cNvPr id="2" name="Picture 1">
-            <a:extLst>
-              <a:ext uri="{FF2B5EF4-FFF2-40B4-BE49-F238E27FC236}">
-                <a16:creationId xmlns:a16="http://schemas.microsoft.com/office/drawing/2014/main" id="{34D0ADE3-95CB-1747-BA16-DC4D4E9A61DA}"/>
-              </a:ext>
-            </a:extLst>
-          </p:cNvPr>
-          <p:cNvPicPr>
-            <a:picLocks noChangeAspect="1"/>
-          </p:cNvPicPr>
-          <p:nvPr/>
-        </p:nvPicPr>
-        <p:blipFill>
-          <a:blip r:embed="rId7"/>
-          <a:stretch>
-            <a:fillRect/>
-          </a:stretch>
-        </p:blipFill>
-        <p:spPr>
-          <a:xfrm>
-            <a:off x="5633433" y="89650"/>
-            <a:ext cx="1049269" cy="369332"/>
-          </a:xfrm>
-          <a:prstGeom prst="rect">
-            <a:avLst/>
-          </a:prstGeom>
-        </p:spPr>
-      </p:pic>
+          <a:noFill/>
+        </p:spPr>
+        <p:txBody>
+          <a:bodyPr wrap="square" rtlCol="0">
+            <a:spAutoFit/>
+          </a:bodyPr>
+          <a:lstStyle/>
+          <a:p>
+            <a:r>
+              <a:rPr lang="en-CA" sz="1400" dirty="0">
+                <a:latin typeface="Helvetica" panose="020B0604020202020204" pitchFamily="34" charset="0"/>
+                <a:cs typeface="Helvetica" panose="020B0604020202020204" pitchFamily="34" charset="0"/>
+              </a:rPr>
+              <a:t>Day 2</a:t>
+            </a:r>
+          </a:p>
+        </p:txBody>
+      </p:sp>
     </p:spTree>
     <p:extLst>
       <p:ext uri="{BB962C8B-B14F-4D97-AF65-F5344CB8AC3E}">
@@ -12406,42 +12421,139 @@
           <a:chExt cx="0" cy="0"/>
         </a:xfrm>
       </p:grpSpPr>
+      <p:grpSp>
+        <p:nvGrpSpPr>
+          <p:cNvPr id="14" name="Group 13">
+            <a:extLst>
+              <a:ext uri="{FF2B5EF4-FFF2-40B4-BE49-F238E27FC236}">
+                <a16:creationId xmlns:a16="http://schemas.microsoft.com/office/drawing/2014/main" id="{7B418429-3B8E-FF7E-E5DA-64CE3B9466C5}"/>
+              </a:ext>
+            </a:extLst>
+          </p:cNvPr>
+          <p:cNvGrpSpPr/>
+          <p:nvPr/>
+        </p:nvGrpSpPr>
+        <p:grpSpPr>
+          <a:xfrm>
+            <a:off x="8091599" y="293084"/>
+            <a:ext cx="2507672" cy="3312980"/>
+            <a:chOff x="8091599" y="293084"/>
+            <a:chExt cx="2507672" cy="3312980"/>
+          </a:xfrm>
+        </p:grpSpPr>
+        <p:pic>
+          <p:nvPicPr>
+            <p:cNvPr id="11" name="Picture 10">
+              <a:extLst>
+                <a:ext uri="{FF2B5EF4-FFF2-40B4-BE49-F238E27FC236}">
+                  <a16:creationId xmlns:a16="http://schemas.microsoft.com/office/drawing/2014/main" id="{8FB53F06-B1F5-DB78-9169-7E394F6D3681}"/>
+                </a:ext>
+              </a:extLst>
+            </p:cNvPr>
+            <p:cNvPicPr>
+              <a:picLocks noChangeAspect="1"/>
+            </p:cNvPicPr>
+            <p:nvPr/>
+          </p:nvPicPr>
+          <p:blipFill>
+            <a:blip r:embed="rId2"/>
+            <a:stretch>
+              <a:fillRect/>
+            </a:stretch>
+          </p:blipFill>
+          <p:spPr>
+            <a:xfrm>
+              <a:off x="8091599" y="293084"/>
+              <a:ext cx="2507672" cy="3044073"/>
+            </a:xfrm>
+            <a:prstGeom prst="rect">
+              <a:avLst/>
+            </a:prstGeom>
+          </p:spPr>
+        </p:pic>
+        <p:sp>
+          <p:nvSpPr>
+            <p:cNvPr id="12" name="TextBox 11">
+              <a:extLst>
+                <a:ext uri="{FF2B5EF4-FFF2-40B4-BE49-F238E27FC236}">
+                  <a16:creationId xmlns:a16="http://schemas.microsoft.com/office/drawing/2014/main" id="{2DB1A470-4919-F56A-C803-52D4530F26D3}"/>
+                </a:ext>
+              </a:extLst>
+            </p:cNvPr>
+            <p:cNvSpPr txBox="1"/>
+            <p:nvPr/>
+          </p:nvSpPr>
+          <p:spPr>
+            <a:xfrm>
+              <a:off x="8783272" y="3289162"/>
+              <a:ext cx="722725" cy="307777"/>
+            </a:xfrm>
+            <a:prstGeom prst="rect">
+              <a:avLst/>
+            </a:prstGeom>
+            <a:noFill/>
+          </p:spPr>
+          <p:txBody>
+            <a:bodyPr wrap="square" rtlCol="0">
+              <a:spAutoFit/>
+            </a:bodyPr>
+            <a:lstStyle/>
+            <a:p>
+              <a:r>
+                <a:rPr lang="en-CA" sz="1400" dirty="0">
+                  <a:latin typeface="Helvetica" panose="020B0604020202020204" pitchFamily="34" charset="0"/>
+                  <a:cs typeface="Helvetica" panose="020B0604020202020204" pitchFamily="34" charset="0"/>
+                </a:rPr>
+                <a:t>Day 1</a:t>
+              </a:r>
+            </a:p>
+          </p:txBody>
+        </p:sp>
+        <p:sp>
+          <p:nvSpPr>
+            <p:cNvPr id="13" name="TextBox 12">
+              <a:extLst>
+                <a:ext uri="{FF2B5EF4-FFF2-40B4-BE49-F238E27FC236}">
+                  <a16:creationId xmlns:a16="http://schemas.microsoft.com/office/drawing/2014/main" id="{B04F6C46-C349-B515-48DC-66BF78F09759}"/>
+                </a:ext>
+              </a:extLst>
+            </p:cNvPr>
+            <p:cNvSpPr txBox="1"/>
+            <p:nvPr/>
+          </p:nvSpPr>
+          <p:spPr>
+            <a:xfrm>
+              <a:off x="9726700" y="3298287"/>
+              <a:ext cx="722725" cy="307777"/>
+            </a:xfrm>
+            <a:prstGeom prst="rect">
+              <a:avLst/>
+            </a:prstGeom>
+            <a:noFill/>
+          </p:spPr>
+          <p:txBody>
+            <a:bodyPr wrap="square" rtlCol="0">
+              <a:spAutoFit/>
+            </a:bodyPr>
+            <a:lstStyle/>
+            <a:p>
+              <a:r>
+                <a:rPr lang="en-CA" sz="1400" dirty="0">
+                  <a:latin typeface="Helvetica" panose="020B0604020202020204" pitchFamily="34" charset="0"/>
+                  <a:cs typeface="Helvetica" panose="020B0604020202020204" pitchFamily="34" charset="0"/>
+                </a:rPr>
+                <a:t>Day 2</a:t>
+              </a:r>
+            </a:p>
+          </p:txBody>
+        </p:sp>
+      </p:grpSp>
       <p:pic>
         <p:nvPicPr>
           <p:cNvPr id="44" name="Picture 43">
             <a:extLst>
               <a:ext uri="{FF2B5EF4-FFF2-40B4-BE49-F238E27FC236}">
                 <a16:creationId xmlns:a16="http://schemas.microsoft.com/office/drawing/2014/main" id="{9A7ECACD-9E20-4237-A1E6-F1CCCED8A379}"/>
-              </a:ext>
-            </a:extLst>
-          </p:cNvPr>
-          <p:cNvPicPr>
-            <a:picLocks noChangeAspect="1"/>
-          </p:cNvPicPr>
-          <p:nvPr/>
-        </p:nvPicPr>
-        <p:blipFill>
-          <a:blip r:embed="rId2"/>
-          <a:stretch>
-            <a:fillRect/>
-          </a:stretch>
-        </p:blipFill>
-        <p:spPr>
-          <a:xfrm>
-            <a:off x="2349272" y="3737839"/>
-            <a:ext cx="2530356" cy="3109162"/>
-          </a:xfrm>
-          <a:prstGeom prst="rect">
-            <a:avLst/>
-          </a:prstGeom>
-        </p:spPr>
-      </p:pic>
-      <p:pic>
-        <p:nvPicPr>
-          <p:cNvPr id="41" name="Picture 40">
-            <a:extLst>
-              <a:ext uri="{FF2B5EF4-FFF2-40B4-BE49-F238E27FC236}">
-                <a16:creationId xmlns:a16="http://schemas.microsoft.com/office/drawing/2014/main" id="{F29AD8C4-0DD6-B7D1-5F74-25531AAD9DEE}"/>
               </a:ext>
             </a:extLst>
           </p:cNvPr>
@@ -12458,8 +12570,8 @@
         </p:blipFill>
         <p:spPr>
           <a:xfrm>
-            <a:off x="8102794" y="296098"/>
-            <a:ext cx="2686865" cy="3246854"/>
+            <a:off x="2349272" y="3737839"/>
+            <a:ext cx="2530356" cy="3109162"/>
           </a:xfrm>
           <a:prstGeom prst="rect">
             <a:avLst/>
@@ -12661,8 +12773,8 @@
           </a:stretch>
         </p:blipFill>
         <p:spPr>
-          <a:xfrm rot="5400000">
-            <a:off x="5329254" y="3702714"/>
+          <a:xfrm rot="16200000">
+            <a:off x="5057417" y="3513543"/>
             <a:ext cx="3013018" cy="3027620"/>
           </a:xfrm>
           <a:prstGeom prst="rect">
@@ -12684,7 +12796,7 @@
         </p:nvGrpSpPr>
         <p:grpSpPr>
           <a:xfrm>
-            <a:off x="8602118" y="3924657"/>
+            <a:off x="6563926" y="5617274"/>
             <a:ext cx="1730444" cy="916588"/>
             <a:chOff x="8151970" y="3700630"/>
             <a:chExt cx="1730444" cy="916588"/>
@@ -13029,35 +13141,6 @@
           <a:xfrm>
             <a:off x="6022148" y="31384"/>
             <a:ext cx="1159788" cy="369332"/>
-          </a:xfrm>
-          <a:prstGeom prst="rect">
-            <a:avLst/>
-          </a:prstGeom>
-        </p:spPr>
-      </p:pic>
-      <p:pic>
-        <p:nvPicPr>
-          <p:cNvPr id="42" name="Picture 41">
-            <a:extLst>
-              <a:ext uri="{FF2B5EF4-FFF2-40B4-BE49-F238E27FC236}">
-                <a16:creationId xmlns:a16="http://schemas.microsoft.com/office/drawing/2014/main" id="{AD36717E-A3DA-49AB-3E52-CB2E900BFFC4}"/>
-              </a:ext>
-            </a:extLst>
-          </p:cNvPr>
-          <p:cNvPicPr>
-            <a:picLocks noChangeAspect="1"/>
-          </p:cNvPicPr>
-          <p:nvPr/>
-        </p:nvPicPr>
-        <p:blipFill rotWithShape="1">
-          <a:blip r:embed="rId7"/>
-          <a:srcRect t="10935"/>
-          <a:stretch/>
-        </p:blipFill>
-        <p:spPr>
-          <a:xfrm>
-            <a:off x="9012527" y="31384"/>
-            <a:ext cx="1241963" cy="369332"/>
           </a:xfrm>
           <a:prstGeom prst="rect">
             <a:avLst/>

</xml_diff>

<commit_message>
Tiny insignificant changes? Things are close to being finalized
</commit_message>
<xml_diff>
--- a/soc_exp_ms_figs.pptx
+++ b/soc_exp_ms_figs.pptx
@@ -9,16 +9,17 @@
     <p:sldId id="263" r:id="rId3"/>
     <p:sldId id="257" r:id="rId4"/>
     <p:sldId id="261" r:id="rId5"/>
-    <p:sldId id="258" r:id="rId6"/>
+    <p:sldId id="274" r:id="rId6"/>
     <p:sldId id="269" r:id="rId7"/>
     <p:sldId id="270" r:id="rId8"/>
     <p:sldId id="271" r:id="rId9"/>
     <p:sldId id="268" r:id="rId10"/>
     <p:sldId id="272" r:id="rId11"/>
     <p:sldId id="273" r:id="rId12"/>
-    <p:sldId id="265" r:id="rId13"/>
-    <p:sldId id="267" r:id="rId14"/>
-    <p:sldId id="262" r:id="rId15"/>
+    <p:sldId id="258" r:id="rId13"/>
+    <p:sldId id="265" r:id="rId14"/>
+    <p:sldId id="267" r:id="rId15"/>
+    <p:sldId id="262" r:id="rId16"/>
   </p:sldIdLst>
   <p:sldSz cx="12192000" cy="6858000"/>
   <p:notesSz cx="6858000" cy="9144000"/>
@@ -123,6 +124,34 @@
     </p:ext>
   </p:extLst>
 </p:presentation>
+</file>
+
+<file path=ppt/authors.xml><?xml version="1.0" encoding="utf-8"?>
+<p188:authorLst xmlns:a="http://schemas.openxmlformats.org/drawingml/2006/main" xmlns:r="http://schemas.openxmlformats.org/officeDocument/2006/relationships" xmlns:p188="http://schemas.microsoft.com/office/powerpoint/2018/8/main">
+  <p188:author id="{2E8574E9-E633-1102-D2B2-45499FAE846B}" name="Janice Yan" initials="JY" userId="S::yanj12@mcmaster.ca::a401e0a6-5297-412f-a646-910792123122" providerId="AD"/>
+</p188:authorLst>
+</file>
+
+<file path=ppt/comments/modernComment_105_6998141D.xml><?xml version="1.0" encoding="utf-8"?>
+<p188:cmLst xmlns:a="http://schemas.openxmlformats.org/drawingml/2006/main" xmlns:r="http://schemas.openxmlformats.org/officeDocument/2006/relationships" xmlns:p188="http://schemas.microsoft.com/office/powerpoint/2018/8/main">
+  <p188:cm id="{DFC53996-961B-47F3-B79F-B8A5723F6C01}" authorId="{2E8574E9-E633-1102-D2B2-45499FAE846B}" created="2024-02-13T03:41:39.065">
+    <ac:deMkLst xmlns:ac="http://schemas.microsoft.com/office/drawing/2013/main/command">
+      <pc:docMk xmlns:pc="http://schemas.microsoft.com/office/powerpoint/2013/main/command"/>
+      <pc:sldMk xmlns:pc="http://schemas.microsoft.com/office/powerpoint/2013/main/command" cId="1771574301" sldId="261"/>
+      <ac:picMk id="10" creationId="{DDB69BEA-FDDB-76A0-2B2E-AA83990F51ED}"/>
+    </ac:deMkLst>
+    <p188:txBody>
+      <a:bodyPr/>
+      <a:lstStyle/>
+      <a:p>
+        <a:r>
+          <a:rPr lang="en-CA"/>
+          <a:t>This doesn't look right but I'm not sure how to show that the main effect of treatment here is significant</a:t>
+        </a:r>
+      </a:p>
+    </p188:txBody>
+  </p188:cm>
+</p188:cmLst>
 </file>
 
 <file path=ppt/slideLayouts/slideLayout1.xml><?xml version="1.0" encoding="utf-8"?>
@@ -3757,6 +3786,1153 @@
 </file>
 
 <file path=ppt/slides/slide12.xml><?xml version="1.0" encoding="utf-8"?>
+<p:sld xmlns:a="http://schemas.openxmlformats.org/drawingml/2006/main" xmlns:r="http://schemas.openxmlformats.org/officeDocument/2006/relationships" xmlns:p="http://schemas.openxmlformats.org/presentationml/2006/main">
+  <p:cSld>
+    <p:spTree>
+      <p:nvGrpSpPr>
+        <p:cNvPr id="1" name=""/>
+        <p:cNvGrpSpPr/>
+        <p:nvPr/>
+      </p:nvGrpSpPr>
+      <p:grpSpPr>
+        <a:xfrm>
+          <a:off x="0" y="0"/>
+          <a:ext cx="0" cy="0"/>
+          <a:chOff x="0" y="0"/>
+          <a:chExt cx="0" cy="0"/>
+        </a:xfrm>
+      </p:grpSpPr>
+      <p:grpSp>
+        <p:nvGrpSpPr>
+          <p:cNvPr id="14" name="Group 13">
+            <a:extLst>
+              <a:ext uri="{FF2B5EF4-FFF2-40B4-BE49-F238E27FC236}">
+                <a16:creationId xmlns:a16="http://schemas.microsoft.com/office/drawing/2014/main" id="{7B418429-3B8E-FF7E-E5DA-64CE3B9466C5}"/>
+              </a:ext>
+            </a:extLst>
+          </p:cNvPr>
+          <p:cNvGrpSpPr/>
+          <p:nvPr/>
+        </p:nvGrpSpPr>
+        <p:grpSpPr>
+          <a:xfrm>
+            <a:off x="8485801" y="284458"/>
+            <a:ext cx="2507672" cy="3312980"/>
+            <a:chOff x="8091599" y="293084"/>
+            <a:chExt cx="2507672" cy="3312980"/>
+          </a:xfrm>
+        </p:grpSpPr>
+        <p:pic>
+          <p:nvPicPr>
+            <p:cNvPr id="11" name="Picture 10">
+              <a:extLst>
+                <a:ext uri="{FF2B5EF4-FFF2-40B4-BE49-F238E27FC236}">
+                  <a16:creationId xmlns:a16="http://schemas.microsoft.com/office/drawing/2014/main" id="{8FB53F06-B1F5-DB78-9169-7E394F6D3681}"/>
+                </a:ext>
+              </a:extLst>
+            </p:cNvPr>
+            <p:cNvPicPr>
+              <a:picLocks noChangeAspect="1"/>
+            </p:cNvPicPr>
+            <p:nvPr/>
+          </p:nvPicPr>
+          <p:blipFill>
+            <a:blip r:embed="rId2"/>
+            <a:stretch>
+              <a:fillRect/>
+            </a:stretch>
+          </p:blipFill>
+          <p:spPr>
+            <a:xfrm>
+              <a:off x="8091599" y="293084"/>
+              <a:ext cx="2507672" cy="3044073"/>
+            </a:xfrm>
+            <a:prstGeom prst="rect">
+              <a:avLst/>
+            </a:prstGeom>
+          </p:spPr>
+        </p:pic>
+        <p:sp>
+          <p:nvSpPr>
+            <p:cNvPr id="12" name="TextBox 11">
+              <a:extLst>
+                <a:ext uri="{FF2B5EF4-FFF2-40B4-BE49-F238E27FC236}">
+                  <a16:creationId xmlns:a16="http://schemas.microsoft.com/office/drawing/2014/main" id="{2DB1A470-4919-F56A-C803-52D4530F26D3}"/>
+                </a:ext>
+              </a:extLst>
+            </p:cNvPr>
+            <p:cNvSpPr txBox="1"/>
+            <p:nvPr/>
+          </p:nvSpPr>
+          <p:spPr>
+            <a:xfrm>
+              <a:off x="8783272" y="3289162"/>
+              <a:ext cx="722725" cy="307777"/>
+            </a:xfrm>
+            <a:prstGeom prst="rect">
+              <a:avLst/>
+            </a:prstGeom>
+            <a:noFill/>
+          </p:spPr>
+          <p:txBody>
+            <a:bodyPr wrap="square" rtlCol="0">
+              <a:spAutoFit/>
+            </a:bodyPr>
+            <a:lstStyle/>
+            <a:p>
+              <a:r>
+                <a:rPr lang="en-CA" sz="1400" dirty="0">
+                  <a:latin typeface="Helvetica" panose="020B0604020202020204" pitchFamily="34" charset="0"/>
+                  <a:cs typeface="Helvetica" panose="020B0604020202020204" pitchFamily="34" charset="0"/>
+                </a:rPr>
+                <a:t>Day 1</a:t>
+              </a:r>
+            </a:p>
+          </p:txBody>
+        </p:sp>
+        <p:sp>
+          <p:nvSpPr>
+            <p:cNvPr id="13" name="TextBox 12">
+              <a:extLst>
+                <a:ext uri="{FF2B5EF4-FFF2-40B4-BE49-F238E27FC236}">
+                  <a16:creationId xmlns:a16="http://schemas.microsoft.com/office/drawing/2014/main" id="{B04F6C46-C349-B515-48DC-66BF78F09759}"/>
+                </a:ext>
+              </a:extLst>
+            </p:cNvPr>
+            <p:cNvSpPr txBox="1"/>
+            <p:nvPr/>
+          </p:nvSpPr>
+          <p:spPr>
+            <a:xfrm>
+              <a:off x="9726700" y="3298287"/>
+              <a:ext cx="722725" cy="307777"/>
+            </a:xfrm>
+            <a:prstGeom prst="rect">
+              <a:avLst/>
+            </a:prstGeom>
+            <a:noFill/>
+          </p:spPr>
+          <p:txBody>
+            <a:bodyPr wrap="square" rtlCol="0">
+              <a:spAutoFit/>
+            </a:bodyPr>
+            <a:lstStyle/>
+            <a:p>
+              <a:r>
+                <a:rPr lang="en-CA" sz="1400" dirty="0">
+                  <a:latin typeface="Helvetica" panose="020B0604020202020204" pitchFamily="34" charset="0"/>
+                  <a:cs typeface="Helvetica" panose="020B0604020202020204" pitchFamily="34" charset="0"/>
+                </a:rPr>
+                <a:t>Day 2</a:t>
+              </a:r>
+            </a:p>
+          </p:txBody>
+        </p:sp>
+      </p:grpSp>
+      <p:pic>
+        <p:nvPicPr>
+          <p:cNvPr id="44" name="Picture 43">
+            <a:extLst>
+              <a:ext uri="{FF2B5EF4-FFF2-40B4-BE49-F238E27FC236}">
+                <a16:creationId xmlns:a16="http://schemas.microsoft.com/office/drawing/2014/main" id="{9A7ECACD-9E20-4237-A1E6-F1CCCED8A379}"/>
+              </a:ext>
+            </a:extLst>
+          </p:cNvPr>
+          <p:cNvPicPr>
+            <a:picLocks noChangeAspect="1"/>
+          </p:cNvPicPr>
+          <p:nvPr/>
+        </p:nvPicPr>
+        <p:blipFill>
+          <a:blip r:embed="rId3"/>
+          <a:stretch>
+            <a:fillRect/>
+          </a:stretch>
+        </p:blipFill>
+        <p:spPr>
+          <a:xfrm>
+            <a:off x="2349272" y="3711961"/>
+            <a:ext cx="2530356" cy="3109162"/>
+          </a:xfrm>
+          <a:prstGeom prst="rect">
+            <a:avLst/>
+          </a:prstGeom>
+        </p:spPr>
+      </p:pic>
+      <p:pic>
+        <p:nvPicPr>
+          <p:cNvPr id="33" name="Picture 32">
+            <a:extLst>
+              <a:ext uri="{FF2B5EF4-FFF2-40B4-BE49-F238E27FC236}">
+                <a16:creationId xmlns:a16="http://schemas.microsoft.com/office/drawing/2014/main" id="{DD6B970F-3AE4-3509-3BBD-89470EEBE01F}"/>
+              </a:ext>
+            </a:extLst>
+          </p:cNvPr>
+          <p:cNvPicPr>
+            <a:picLocks noChangeAspect="1"/>
+          </p:cNvPicPr>
+          <p:nvPr/>
+        </p:nvPicPr>
+        <p:blipFill>
+          <a:blip r:embed="rId4"/>
+          <a:stretch>
+            <a:fillRect/>
+          </a:stretch>
+        </p:blipFill>
+        <p:spPr>
+          <a:xfrm>
+            <a:off x="5255115" y="327013"/>
+            <a:ext cx="2686866" cy="3212440"/>
+          </a:xfrm>
+          <a:prstGeom prst="rect">
+            <a:avLst/>
+          </a:prstGeom>
+        </p:spPr>
+      </p:pic>
+      <p:pic>
+        <p:nvPicPr>
+          <p:cNvPr id="23" name="Picture 22">
+            <a:extLst>
+              <a:ext uri="{FF2B5EF4-FFF2-40B4-BE49-F238E27FC236}">
+                <a16:creationId xmlns:a16="http://schemas.microsoft.com/office/drawing/2014/main" id="{D9D837A1-52FF-1993-630D-737B4D5D128C}"/>
+              </a:ext>
+            </a:extLst>
+          </p:cNvPr>
+          <p:cNvPicPr>
+            <a:picLocks noChangeAspect="1"/>
+          </p:cNvPicPr>
+          <p:nvPr/>
+        </p:nvPicPr>
+        <p:blipFill>
+          <a:blip r:embed="rId5"/>
+          <a:stretch>
+            <a:fillRect/>
+          </a:stretch>
+        </p:blipFill>
+        <p:spPr>
+          <a:xfrm>
+            <a:off x="1972014" y="293084"/>
+            <a:ext cx="2717890" cy="3246369"/>
+          </a:xfrm>
+          <a:prstGeom prst="rect">
+            <a:avLst/>
+          </a:prstGeom>
+        </p:spPr>
+      </p:pic>
+      <p:sp>
+        <p:nvSpPr>
+          <p:cNvPr id="35" name="TextBox 34">
+            <a:extLst>
+              <a:ext uri="{FF2B5EF4-FFF2-40B4-BE49-F238E27FC236}">
+                <a16:creationId xmlns:a16="http://schemas.microsoft.com/office/drawing/2014/main" id="{9BDD70AF-2141-D8D8-829C-8E0098FBAEB1}"/>
+              </a:ext>
+            </a:extLst>
+          </p:cNvPr>
+          <p:cNvSpPr txBox="1"/>
+          <p:nvPr/>
+        </p:nvSpPr>
+        <p:spPr>
+          <a:xfrm>
+            <a:off x="1785715" y="34316"/>
+            <a:ext cx="389850" cy="369332"/>
+          </a:xfrm>
+          <a:prstGeom prst="rect">
+            <a:avLst/>
+          </a:prstGeom>
+          <a:noFill/>
+        </p:spPr>
+        <p:txBody>
+          <a:bodyPr wrap="none" rtlCol="0">
+            <a:spAutoFit/>
+          </a:bodyPr>
+          <a:lstStyle/>
+          <a:p>
+            <a:r>
+              <a:rPr lang="en-CA" b="1" dirty="0">
+                <a:latin typeface="Helvetica" panose="020B0604020202020204" pitchFamily="34" charset="0"/>
+                <a:cs typeface="Helvetica" panose="020B0604020202020204" pitchFamily="34" charset="0"/>
+              </a:rPr>
+              <a:t>a)</a:t>
+            </a:r>
+          </a:p>
+        </p:txBody>
+      </p:sp>
+      <p:sp>
+        <p:nvSpPr>
+          <p:cNvPr id="37" name="TextBox 36">
+            <a:extLst>
+              <a:ext uri="{FF2B5EF4-FFF2-40B4-BE49-F238E27FC236}">
+                <a16:creationId xmlns:a16="http://schemas.microsoft.com/office/drawing/2014/main" id="{A6D8CB02-B6E1-A30C-DD0E-ECDA52F1D6D0}"/>
+              </a:ext>
+            </a:extLst>
+          </p:cNvPr>
+          <p:cNvSpPr txBox="1"/>
+          <p:nvPr/>
+        </p:nvSpPr>
+        <p:spPr>
+          <a:xfrm>
+            <a:off x="5166446" y="46172"/>
+            <a:ext cx="402674" cy="369332"/>
+          </a:xfrm>
+          <a:prstGeom prst="rect">
+            <a:avLst/>
+          </a:prstGeom>
+          <a:noFill/>
+        </p:spPr>
+        <p:txBody>
+          <a:bodyPr wrap="none" rtlCol="0">
+            <a:spAutoFit/>
+          </a:bodyPr>
+          <a:lstStyle/>
+          <a:p>
+            <a:r>
+              <a:rPr lang="en-CA" b="1" dirty="0">
+                <a:latin typeface="Helvetica" panose="020B0604020202020204" pitchFamily="34" charset="0"/>
+                <a:cs typeface="Helvetica" panose="020B0604020202020204" pitchFamily="34" charset="0"/>
+              </a:rPr>
+              <a:t>b)</a:t>
+            </a:r>
+          </a:p>
+        </p:txBody>
+      </p:sp>
+      <p:sp>
+        <p:nvSpPr>
+          <p:cNvPr id="38" name="TextBox 37">
+            <a:extLst>
+              <a:ext uri="{FF2B5EF4-FFF2-40B4-BE49-F238E27FC236}">
+                <a16:creationId xmlns:a16="http://schemas.microsoft.com/office/drawing/2014/main" id="{BDCA46F9-2BAC-D33F-CE14-8141568EAA3F}"/>
+              </a:ext>
+            </a:extLst>
+          </p:cNvPr>
+          <p:cNvSpPr txBox="1"/>
+          <p:nvPr/>
+        </p:nvSpPr>
+        <p:spPr>
+          <a:xfrm>
+            <a:off x="8353925" y="58979"/>
+            <a:ext cx="389850" cy="369332"/>
+          </a:xfrm>
+          <a:prstGeom prst="rect">
+            <a:avLst/>
+          </a:prstGeom>
+          <a:noFill/>
+        </p:spPr>
+        <p:txBody>
+          <a:bodyPr wrap="none" rtlCol="0">
+            <a:spAutoFit/>
+          </a:bodyPr>
+          <a:lstStyle/>
+          <a:p>
+            <a:r>
+              <a:rPr lang="en-CA" b="1" dirty="0">
+                <a:latin typeface="Helvetica" panose="020B0604020202020204" pitchFamily="34" charset="0"/>
+                <a:cs typeface="Helvetica" panose="020B0604020202020204" pitchFamily="34" charset="0"/>
+              </a:rPr>
+              <a:t>c)</a:t>
+            </a:r>
+          </a:p>
+        </p:txBody>
+      </p:sp>
+      <p:pic>
+        <p:nvPicPr>
+          <p:cNvPr id="2" name="Picture 1">
+            <a:extLst>
+              <a:ext uri="{FF2B5EF4-FFF2-40B4-BE49-F238E27FC236}">
+                <a16:creationId xmlns:a16="http://schemas.microsoft.com/office/drawing/2014/main" id="{92095A55-61E0-4329-B320-7D9BCA810BD3}"/>
+              </a:ext>
+            </a:extLst>
+          </p:cNvPr>
+          <p:cNvPicPr>
+            <a:picLocks noChangeAspect="1"/>
+          </p:cNvPicPr>
+          <p:nvPr/>
+        </p:nvPicPr>
+        <p:blipFill>
+          <a:blip r:embed="rId6"/>
+          <a:stretch>
+            <a:fillRect/>
+          </a:stretch>
+        </p:blipFill>
+        <p:spPr>
+          <a:xfrm rot="16200000">
+            <a:off x="4928025" y="3513543"/>
+            <a:ext cx="3013018" cy="3027620"/>
+          </a:xfrm>
+          <a:prstGeom prst="rect">
+            <a:avLst/>
+          </a:prstGeom>
+        </p:spPr>
+      </p:pic>
+      <p:grpSp>
+        <p:nvGrpSpPr>
+          <p:cNvPr id="3" name="Group 2">
+            <a:extLst>
+              <a:ext uri="{FF2B5EF4-FFF2-40B4-BE49-F238E27FC236}">
+                <a16:creationId xmlns:a16="http://schemas.microsoft.com/office/drawing/2014/main" id="{78E82448-D15C-B450-D32E-712764E23B6A}"/>
+              </a:ext>
+            </a:extLst>
+          </p:cNvPr>
+          <p:cNvGrpSpPr/>
+          <p:nvPr/>
+        </p:nvGrpSpPr>
+        <p:grpSpPr>
+          <a:xfrm>
+            <a:off x="6434534" y="5617274"/>
+            <a:ext cx="1730444" cy="916588"/>
+            <a:chOff x="8151970" y="3700630"/>
+            <a:chExt cx="1730444" cy="916588"/>
+          </a:xfrm>
+        </p:grpSpPr>
+        <p:sp>
+          <p:nvSpPr>
+            <p:cNvPr id="4" name="Oval 3">
+              <a:extLst>
+                <a:ext uri="{FF2B5EF4-FFF2-40B4-BE49-F238E27FC236}">
+                  <a16:creationId xmlns:a16="http://schemas.microsoft.com/office/drawing/2014/main" id="{B89066EF-A063-E23D-B803-CD6678F29AEE}"/>
+                </a:ext>
+              </a:extLst>
+            </p:cNvPr>
+            <p:cNvSpPr/>
+            <p:nvPr/>
+          </p:nvSpPr>
+          <p:spPr>
+            <a:xfrm>
+              <a:off x="8151970" y="3761117"/>
+              <a:ext cx="181154" cy="189781"/>
+            </a:xfrm>
+            <a:prstGeom prst="ellipse">
+              <a:avLst/>
+            </a:prstGeom>
+            <a:solidFill>
+              <a:srgbClr val="FACC8F"/>
+            </a:solidFill>
+            <a:ln>
+              <a:solidFill>
+                <a:schemeClr val="tx1">
+                  <a:lumMod val="85000"/>
+                  <a:lumOff val="15000"/>
+                </a:schemeClr>
+              </a:solidFill>
+            </a:ln>
+          </p:spPr>
+          <p:style>
+            <a:lnRef idx="2">
+              <a:schemeClr val="accent1">
+                <a:shade val="15000"/>
+              </a:schemeClr>
+            </a:lnRef>
+            <a:fillRef idx="1">
+              <a:schemeClr val="accent1"/>
+            </a:fillRef>
+            <a:effectRef idx="0">
+              <a:schemeClr val="accent1"/>
+            </a:effectRef>
+            <a:fontRef idx="minor">
+              <a:schemeClr val="lt1"/>
+            </a:fontRef>
+          </p:style>
+          <p:txBody>
+            <a:bodyPr rtlCol="0" anchor="ctr"/>
+            <a:lstStyle/>
+            <a:p>
+              <a:pPr algn="ctr"/>
+              <a:endParaRPr lang="en-CA" dirty="0"/>
+            </a:p>
+          </p:txBody>
+        </p:sp>
+        <p:sp>
+          <p:nvSpPr>
+            <p:cNvPr id="5" name="Oval 4">
+              <a:extLst>
+                <a:ext uri="{FF2B5EF4-FFF2-40B4-BE49-F238E27FC236}">
+                  <a16:creationId xmlns:a16="http://schemas.microsoft.com/office/drawing/2014/main" id="{FAB00F24-AF37-38F1-DBBA-9D95166EA524}"/>
+                </a:ext>
+              </a:extLst>
+            </p:cNvPr>
+            <p:cNvSpPr/>
+            <p:nvPr/>
+          </p:nvSpPr>
+          <p:spPr>
+            <a:xfrm>
+              <a:off x="8151970" y="4065917"/>
+              <a:ext cx="181154" cy="189781"/>
+            </a:xfrm>
+            <a:prstGeom prst="ellipse">
+              <a:avLst/>
+            </a:prstGeom>
+            <a:solidFill>
+              <a:srgbClr val="E6722A"/>
+            </a:solidFill>
+            <a:ln>
+              <a:solidFill>
+                <a:schemeClr val="tx1">
+                  <a:lumMod val="85000"/>
+                  <a:lumOff val="15000"/>
+                </a:schemeClr>
+              </a:solidFill>
+            </a:ln>
+          </p:spPr>
+          <p:style>
+            <a:lnRef idx="2">
+              <a:schemeClr val="accent1">
+                <a:shade val="15000"/>
+              </a:schemeClr>
+            </a:lnRef>
+            <a:fillRef idx="1">
+              <a:schemeClr val="accent1"/>
+            </a:fillRef>
+            <a:effectRef idx="0">
+              <a:schemeClr val="accent1"/>
+            </a:effectRef>
+            <a:fontRef idx="minor">
+              <a:schemeClr val="lt1"/>
+            </a:fontRef>
+          </p:style>
+          <p:txBody>
+            <a:bodyPr rtlCol="0" anchor="ctr"/>
+            <a:lstStyle/>
+            <a:p>
+              <a:pPr algn="ctr"/>
+              <a:endParaRPr lang="en-CA" dirty="0"/>
+            </a:p>
+          </p:txBody>
+        </p:sp>
+        <p:sp>
+          <p:nvSpPr>
+            <p:cNvPr id="6" name="Oval 5">
+              <a:extLst>
+                <a:ext uri="{FF2B5EF4-FFF2-40B4-BE49-F238E27FC236}">
+                  <a16:creationId xmlns:a16="http://schemas.microsoft.com/office/drawing/2014/main" id="{2951DF17-7B32-8388-87A4-306436F9A052}"/>
+                </a:ext>
+              </a:extLst>
+            </p:cNvPr>
+            <p:cNvSpPr/>
+            <p:nvPr/>
+          </p:nvSpPr>
+          <p:spPr>
+            <a:xfrm>
+              <a:off x="8151970" y="4370717"/>
+              <a:ext cx="181154" cy="189781"/>
+            </a:xfrm>
+            <a:prstGeom prst="ellipse">
+              <a:avLst/>
+            </a:prstGeom>
+            <a:solidFill>
+              <a:srgbClr val="404040"/>
+            </a:solidFill>
+            <a:ln>
+              <a:solidFill>
+                <a:schemeClr val="tx1">
+                  <a:lumMod val="85000"/>
+                  <a:lumOff val="15000"/>
+                </a:schemeClr>
+              </a:solidFill>
+            </a:ln>
+          </p:spPr>
+          <p:style>
+            <a:lnRef idx="2">
+              <a:schemeClr val="accent1">
+                <a:shade val="15000"/>
+              </a:schemeClr>
+            </a:lnRef>
+            <a:fillRef idx="1">
+              <a:schemeClr val="accent1"/>
+            </a:fillRef>
+            <a:effectRef idx="0">
+              <a:schemeClr val="accent1"/>
+            </a:effectRef>
+            <a:fontRef idx="minor">
+              <a:schemeClr val="lt1"/>
+            </a:fontRef>
+          </p:style>
+          <p:txBody>
+            <a:bodyPr rtlCol="0" anchor="ctr"/>
+            <a:lstStyle/>
+            <a:p>
+              <a:pPr algn="ctr"/>
+              <a:endParaRPr lang="en-CA" dirty="0"/>
+            </a:p>
+          </p:txBody>
+        </p:sp>
+        <p:sp>
+          <p:nvSpPr>
+            <p:cNvPr id="7" name="TextBox 6">
+              <a:extLst>
+                <a:ext uri="{FF2B5EF4-FFF2-40B4-BE49-F238E27FC236}">
+                  <a16:creationId xmlns:a16="http://schemas.microsoft.com/office/drawing/2014/main" id="{C71A3A39-8F55-D52B-6159-89472422DC37}"/>
+                </a:ext>
+              </a:extLst>
+            </p:cNvPr>
+            <p:cNvSpPr txBox="1"/>
+            <p:nvPr/>
+          </p:nvSpPr>
+          <p:spPr>
+            <a:xfrm>
+              <a:off x="8333124" y="3700630"/>
+              <a:ext cx="1549290" cy="307777"/>
+            </a:xfrm>
+            <a:prstGeom prst="rect">
+              <a:avLst/>
+            </a:prstGeom>
+            <a:noFill/>
+          </p:spPr>
+          <p:txBody>
+            <a:bodyPr wrap="square" rtlCol="0">
+              <a:spAutoFit/>
+            </a:bodyPr>
+            <a:lstStyle/>
+            <a:p>
+              <a:r>
+                <a:rPr lang="en-CA" sz="1400" dirty="0">
+                  <a:latin typeface="Helvetica" panose="020B0604020202020204" pitchFamily="34" charset="0"/>
+                  <a:cs typeface="Helvetica" panose="020B0604020202020204" pitchFamily="34" charset="0"/>
+                </a:rPr>
+                <a:t>Isolated female</a:t>
+              </a:r>
+            </a:p>
+          </p:txBody>
+        </p:sp>
+        <p:sp>
+          <p:nvSpPr>
+            <p:cNvPr id="8" name="TextBox 7">
+              <a:extLst>
+                <a:ext uri="{FF2B5EF4-FFF2-40B4-BE49-F238E27FC236}">
+                  <a16:creationId xmlns:a16="http://schemas.microsoft.com/office/drawing/2014/main" id="{0C69F0BF-36DD-AF86-2FB3-D6EAB38E0556}"/>
+                </a:ext>
+              </a:extLst>
+            </p:cNvPr>
+            <p:cNvSpPr txBox="1"/>
+            <p:nvPr/>
+          </p:nvSpPr>
+          <p:spPr>
+            <a:xfrm>
+              <a:off x="8333124" y="4001664"/>
+              <a:ext cx="1549290" cy="307777"/>
+            </a:xfrm>
+            <a:prstGeom prst="rect">
+              <a:avLst/>
+            </a:prstGeom>
+            <a:noFill/>
+          </p:spPr>
+          <p:txBody>
+            <a:bodyPr wrap="square" rtlCol="0">
+              <a:spAutoFit/>
+            </a:bodyPr>
+            <a:lstStyle/>
+            <a:p>
+              <a:r>
+                <a:rPr lang="en-CA" sz="1400" dirty="0">
+                  <a:latin typeface="Helvetica" panose="020B0604020202020204" pitchFamily="34" charset="0"/>
+                  <a:cs typeface="Helvetica" panose="020B0604020202020204" pitchFamily="34" charset="0"/>
+                </a:rPr>
+                <a:t>Social female</a:t>
+              </a:r>
+            </a:p>
+          </p:txBody>
+        </p:sp>
+        <p:sp>
+          <p:nvSpPr>
+            <p:cNvPr id="9" name="TextBox 8">
+              <a:extLst>
+                <a:ext uri="{FF2B5EF4-FFF2-40B4-BE49-F238E27FC236}">
+                  <a16:creationId xmlns:a16="http://schemas.microsoft.com/office/drawing/2014/main" id="{2EBB8F86-C0C0-F1FC-CE3C-327B2E36E056}"/>
+                </a:ext>
+              </a:extLst>
+            </p:cNvPr>
+            <p:cNvSpPr txBox="1"/>
+            <p:nvPr/>
+          </p:nvSpPr>
+          <p:spPr>
+            <a:xfrm>
+              <a:off x="8333124" y="4309441"/>
+              <a:ext cx="1549290" cy="307777"/>
+            </a:xfrm>
+            <a:prstGeom prst="rect">
+              <a:avLst/>
+            </a:prstGeom>
+            <a:noFill/>
+          </p:spPr>
+          <p:txBody>
+            <a:bodyPr wrap="square" rtlCol="0">
+              <a:spAutoFit/>
+            </a:bodyPr>
+            <a:lstStyle/>
+            <a:p>
+              <a:r>
+                <a:rPr lang="en-CA" sz="1400" dirty="0">
+                  <a:latin typeface="Helvetica" panose="020B0604020202020204" pitchFamily="34" charset="0"/>
+                  <a:cs typeface="Helvetica" panose="020B0604020202020204" pitchFamily="34" charset="0"/>
+                </a:rPr>
+                <a:t>Male</a:t>
+              </a:r>
+            </a:p>
+          </p:txBody>
+        </p:sp>
+      </p:grpSp>
+      <p:pic>
+        <p:nvPicPr>
+          <p:cNvPr id="20" name="Picture 19">
+            <a:extLst>
+              <a:ext uri="{FF2B5EF4-FFF2-40B4-BE49-F238E27FC236}">
+                <a16:creationId xmlns:a16="http://schemas.microsoft.com/office/drawing/2014/main" id="{BFF7258C-908C-93CA-6B25-7C88D0D99E60}"/>
+              </a:ext>
+            </a:extLst>
+          </p:cNvPr>
+          <p:cNvPicPr>
+            <a:picLocks noChangeAspect="1"/>
+          </p:cNvPicPr>
+          <p:nvPr/>
+        </p:nvPicPr>
+        <p:blipFill>
+          <a:blip r:embed="rId7"/>
+          <a:stretch>
+            <a:fillRect/>
+          </a:stretch>
+        </p:blipFill>
+        <p:spPr>
+          <a:xfrm>
+            <a:off x="3085228" y="53326"/>
+            <a:ext cx="1159788" cy="414679"/>
+          </a:xfrm>
+          <a:prstGeom prst="rect">
+            <a:avLst/>
+          </a:prstGeom>
+        </p:spPr>
+      </p:pic>
+      <p:pic>
+        <p:nvPicPr>
+          <p:cNvPr id="36" name="Picture 35">
+            <a:extLst>
+              <a:ext uri="{FF2B5EF4-FFF2-40B4-BE49-F238E27FC236}">
+                <a16:creationId xmlns:a16="http://schemas.microsoft.com/office/drawing/2014/main" id="{E5F364F9-D7F8-C2E2-5153-351C2D7949B2}"/>
+              </a:ext>
+            </a:extLst>
+          </p:cNvPr>
+          <p:cNvPicPr>
+            <a:picLocks noChangeAspect="1"/>
+          </p:cNvPicPr>
+          <p:nvPr/>
+        </p:nvPicPr>
+        <p:blipFill rotWithShape="1">
+          <a:blip r:embed="rId7"/>
+          <a:srcRect t="10935"/>
+          <a:stretch/>
+        </p:blipFill>
+        <p:spPr>
+          <a:xfrm>
+            <a:off x="6358200" y="43240"/>
+            <a:ext cx="1159788" cy="369332"/>
+          </a:xfrm>
+          <a:prstGeom prst="rect">
+            <a:avLst/>
+          </a:prstGeom>
+        </p:spPr>
+      </p:pic>
+      <p:pic>
+        <p:nvPicPr>
+          <p:cNvPr id="45" name="Picture 44">
+            <a:extLst>
+              <a:ext uri="{FF2B5EF4-FFF2-40B4-BE49-F238E27FC236}">
+                <a16:creationId xmlns:a16="http://schemas.microsoft.com/office/drawing/2014/main" id="{532DB935-83FE-FE49-1757-7B89882AA33B}"/>
+              </a:ext>
+            </a:extLst>
+          </p:cNvPr>
+          <p:cNvPicPr>
+            <a:picLocks noChangeAspect="1"/>
+          </p:cNvPicPr>
+          <p:nvPr/>
+        </p:nvPicPr>
+        <p:blipFill rotWithShape="1">
+          <a:blip r:embed="rId7"/>
+          <a:srcRect t="10935"/>
+          <a:stretch/>
+        </p:blipFill>
+        <p:spPr>
+          <a:xfrm>
+            <a:off x="3198655" y="3539453"/>
+            <a:ext cx="1159788" cy="355228"/>
+          </a:xfrm>
+          <a:prstGeom prst="rect">
+            <a:avLst/>
+          </a:prstGeom>
+        </p:spPr>
+      </p:pic>
+      <p:sp>
+        <p:nvSpPr>
+          <p:cNvPr id="46" name="TextBox 45">
+            <a:extLst>
+              <a:ext uri="{FF2B5EF4-FFF2-40B4-BE49-F238E27FC236}">
+                <a16:creationId xmlns:a16="http://schemas.microsoft.com/office/drawing/2014/main" id="{203413DA-A5F2-9994-7213-77F51D3EE326}"/>
+              </a:ext>
+            </a:extLst>
+          </p:cNvPr>
+          <p:cNvSpPr txBox="1"/>
+          <p:nvPr/>
+        </p:nvSpPr>
+        <p:spPr>
+          <a:xfrm>
+            <a:off x="1884550" y="3544547"/>
+            <a:ext cx="402674" cy="369332"/>
+          </a:xfrm>
+          <a:prstGeom prst="rect">
+            <a:avLst/>
+          </a:prstGeom>
+          <a:noFill/>
+        </p:spPr>
+        <p:txBody>
+          <a:bodyPr wrap="none" rtlCol="0">
+            <a:spAutoFit/>
+          </a:bodyPr>
+          <a:lstStyle/>
+          <a:p>
+            <a:r>
+              <a:rPr lang="en-CA" b="1" dirty="0">
+                <a:latin typeface="Helvetica" panose="020B0604020202020204" pitchFamily="34" charset="0"/>
+                <a:cs typeface="Helvetica" panose="020B0604020202020204" pitchFamily="34" charset="0"/>
+              </a:rPr>
+              <a:t>d)</a:t>
+            </a:r>
+          </a:p>
+        </p:txBody>
+      </p:sp>
+      <p:sp>
+        <p:nvSpPr>
+          <p:cNvPr id="47" name="TextBox 46">
+            <a:extLst>
+              <a:ext uri="{FF2B5EF4-FFF2-40B4-BE49-F238E27FC236}">
+                <a16:creationId xmlns:a16="http://schemas.microsoft.com/office/drawing/2014/main" id="{3C40B85C-7741-0C6A-AABC-55F80FECAB64}"/>
+              </a:ext>
+            </a:extLst>
+          </p:cNvPr>
+          <p:cNvSpPr txBox="1"/>
+          <p:nvPr/>
+        </p:nvSpPr>
+        <p:spPr>
+          <a:xfrm>
+            <a:off x="4915232" y="3545566"/>
+            <a:ext cx="389850" cy="369332"/>
+          </a:xfrm>
+          <a:prstGeom prst="rect">
+            <a:avLst/>
+          </a:prstGeom>
+          <a:noFill/>
+        </p:spPr>
+        <p:txBody>
+          <a:bodyPr wrap="none" rtlCol="0">
+            <a:spAutoFit/>
+          </a:bodyPr>
+          <a:lstStyle/>
+          <a:p>
+            <a:r>
+              <a:rPr lang="en-CA" b="1" dirty="0">
+                <a:solidFill>
+                  <a:schemeClr val="tx1">
+                    <a:lumMod val="75000"/>
+                    <a:lumOff val="25000"/>
+                  </a:schemeClr>
+                </a:solidFill>
+                <a:latin typeface="Helvetica" panose="020B0604020202020204" pitchFamily="34" charset="0"/>
+                <a:cs typeface="Helvetica" panose="020B0604020202020204" pitchFamily="34" charset="0"/>
+              </a:rPr>
+              <a:t>e)</a:t>
+            </a:r>
+          </a:p>
+        </p:txBody>
+      </p:sp>
+      <p:pic>
+        <p:nvPicPr>
+          <p:cNvPr id="15" name="Picture 14">
+            <a:extLst>
+              <a:ext uri="{FF2B5EF4-FFF2-40B4-BE49-F238E27FC236}">
+                <a16:creationId xmlns:a16="http://schemas.microsoft.com/office/drawing/2014/main" id="{33A76E3A-DFAA-6462-DDC2-E3F883AECFCD}"/>
+              </a:ext>
+            </a:extLst>
+          </p:cNvPr>
+          <p:cNvPicPr>
+            <a:picLocks noChangeAspect="1"/>
+          </p:cNvPicPr>
+          <p:nvPr/>
+        </p:nvPicPr>
+        <p:blipFill>
+          <a:blip r:embed="rId8"/>
+          <a:stretch>
+            <a:fillRect/>
+          </a:stretch>
+        </p:blipFill>
+        <p:spPr>
+          <a:xfrm>
+            <a:off x="8155378" y="3536758"/>
+            <a:ext cx="2751835" cy="3092878"/>
+          </a:xfrm>
+          <a:prstGeom prst="rect">
+            <a:avLst/>
+          </a:prstGeom>
+        </p:spPr>
+      </p:pic>
+      <p:sp>
+        <p:nvSpPr>
+          <p:cNvPr id="16" name="TextBox 15">
+            <a:extLst>
+              <a:ext uri="{FF2B5EF4-FFF2-40B4-BE49-F238E27FC236}">
+                <a16:creationId xmlns:a16="http://schemas.microsoft.com/office/drawing/2014/main" id="{129710E0-08F7-5CEF-758E-BFFD935DD7CA}"/>
+              </a:ext>
+            </a:extLst>
+          </p:cNvPr>
+          <p:cNvSpPr txBox="1"/>
+          <p:nvPr/>
+        </p:nvSpPr>
+        <p:spPr>
+          <a:xfrm>
+            <a:off x="8095951" y="3520843"/>
+            <a:ext cx="338554" cy="369332"/>
+          </a:xfrm>
+          <a:prstGeom prst="rect">
+            <a:avLst/>
+          </a:prstGeom>
+          <a:noFill/>
+        </p:spPr>
+        <p:txBody>
+          <a:bodyPr wrap="none" rtlCol="0">
+            <a:spAutoFit/>
+          </a:bodyPr>
+          <a:lstStyle/>
+          <a:p>
+            <a:r>
+              <a:rPr lang="en-CA" b="1" dirty="0">
+                <a:latin typeface="Helvetica" panose="020B0604020202020204" pitchFamily="34" charset="0"/>
+                <a:cs typeface="Helvetica" panose="020B0604020202020204" pitchFamily="34" charset="0"/>
+              </a:rPr>
+              <a:t>f)</a:t>
+            </a:r>
+          </a:p>
+        </p:txBody>
+      </p:sp>
+      <p:sp>
+        <p:nvSpPr>
+          <p:cNvPr id="17" name="TextBox 16">
+            <a:extLst>
+              <a:ext uri="{FF2B5EF4-FFF2-40B4-BE49-F238E27FC236}">
+                <a16:creationId xmlns:a16="http://schemas.microsoft.com/office/drawing/2014/main" id="{EEB9FCA1-1594-B6B4-7C5C-A4BF7C39A6C3}"/>
+              </a:ext>
+            </a:extLst>
+          </p:cNvPr>
+          <p:cNvSpPr txBox="1"/>
+          <p:nvPr/>
+        </p:nvSpPr>
+        <p:spPr>
+          <a:xfrm>
+            <a:off x="9105588" y="6593516"/>
+            <a:ext cx="722725" cy="307777"/>
+          </a:xfrm>
+          <a:prstGeom prst="rect">
+            <a:avLst/>
+          </a:prstGeom>
+          <a:noFill/>
+        </p:spPr>
+        <p:txBody>
+          <a:bodyPr wrap="square" rtlCol="0">
+            <a:spAutoFit/>
+          </a:bodyPr>
+          <a:lstStyle/>
+          <a:p>
+            <a:r>
+              <a:rPr lang="en-CA" sz="1400" dirty="0">
+                <a:latin typeface="Helvetica" panose="020B0604020202020204" pitchFamily="34" charset="0"/>
+                <a:cs typeface="Helvetica" panose="020B0604020202020204" pitchFamily="34" charset="0"/>
+              </a:rPr>
+              <a:t>Day 1</a:t>
+            </a:r>
+          </a:p>
+        </p:txBody>
+      </p:sp>
+      <p:sp>
+        <p:nvSpPr>
+          <p:cNvPr id="18" name="TextBox 17">
+            <a:extLst>
+              <a:ext uri="{FF2B5EF4-FFF2-40B4-BE49-F238E27FC236}">
+                <a16:creationId xmlns:a16="http://schemas.microsoft.com/office/drawing/2014/main" id="{E72C3A1B-7F55-E7C8-5E61-C82DC1D4FF41}"/>
+              </a:ext>
+            </a:extLst>
+          </p:cNvPr>
+          <p:cNvSpPr txBox="1"/>
+          <p:nvPr/>
+        </p:nvSpPr>
+        <p:spPr>
+          <a:xfrm>
+            <a:off x="10049016" y="6602641"/>
+            <a:ext cx="722725" cy="307777"/>
+          </a:xfrm>
+          <a:prstGeom prst="rect">
+            <a:avLst/>
+          </a:prstGeom>
+          <a:noFill/>
+        </p:spPr>
+        <p:txBody>
+          <a:bodyPr wrap="square" rtlCol="0">
+            <a:spAutoFit/>
+          </a:bodyPr>
+          <a:lstStyle/>
+          <a:p>
+            <a:r>
+              <a:rPr lang="en-CA" sz="1400" dirty="0">
+                <a:latin typeface="Helvetica" panose="020B0604020202020204" pitchFamily="34" charset="0"/>
+                <a:cs typeface="Helvetica" panose="020B0604020202020204" pitchFamily="34" charset="0"/>
+              </a:rPr>
+              <a:t>Day 2</a:t>
+            </a:r>
+          </a:p>
+        </p:txBody>
+      </p:sp>
+      <p:pic>
+        <p:nvPicPr>
+          <p:cNvPr id="19" name="Picture 18">
+            <a:extLst>
+              <a:ext uri="{FF2B5EF4-FFF2-40B4-BE49-F238E27FC236}">
+                <a16:creationId xmlns:a16="http://schemas.microsoft.com/office/drawing/2014/main" id="{7469D62A-6A52-8FB5-2419-01F8D9AD7A0D}"/>
+              </a:ext>
+            </a:extLst>
+          </p:cNvPr>
+          <p:cNvPicPr>
+            <a:picLocks noChangeAspect="1"/>
+          </p:cNvPicPr>
+          <p:nvPr/>
+        </p:nvPicPr>
+        <p:blipFill>
+          <a:blip r:embed="rId9"/>
+          <a:stretch>
+            <a:fillRect/>
+          </a:stretch>
+        </p:blipFill>
+        <p:spPr>
+          <a:xfrm>
+            <a:off x="9177414" y="227906"/>
+            <a:ext cx="562661" cy="227140"/>
+          </a:xfrm>
+          <a:prstGeom prst="rect">
+            <a:avLst/>
+          </a:prstGeom>
+        </p:spPr>
+      </p:pic>
+      <p:pic>
+        <p:nvPicPr>
+          <p:cNvPr id="21" name="Picture 20">
+            <a:extLst>
+              <a:ext uri="{FF2B5EF4-FFF2-40B4-BE49-F238E27FC236}">
+                <a16:creationId xmlns:a16="http://schemas.microsoft.com/office/drawing/2014/main" id="{60F09346-A943-C4B1-8A9A-11C333BB6E6E}"/>
+              </a:ext>
+            </a:extLst>
+          </p:cNvPr>
+          <p:cNvPicPr>
+            <a:picLocks noChangeAspect="1"/>
+          </p:cNvPicPr>
+          <p:nvPr/>
+        </p:nvPicPr>
+        <p:blipFill>
+          <a:blip r:embed="rId9"/>
+          <a:stretch>
+            <a:fillRect/>
+          </a:stretch>
+        </p:blipFill>
+        <p:spPr>
+          <a:xfrm>
+            <a:off x="10173715" y="230085"/>
+            <a:ext cx="562661" cy="227140"/>
+          </a:xfrm>
+          <a:prstGeom prst="rect">
+            <a:avLst/>
+          </a:prstGeom>
+        </p:spPr>
+      </p:pic>
+      <p:sp>
+        <p:nvSpPr>
+          <p:cNvPr id="22" name="TextBox 21">
+            <a:extLst>
+              <a:ext uri="{FF2B5EF4-FFF2-40B4-BE49-F238E27FC236}">
+                <a16:creationId xmlns:a16="http://schemas.microsoft.com/office/drawing/2014/main" id="{32D6151E-182F-1442-900C-40C867CE90D5}"/>
+              </a:ext>
+            </a:extLst>
+          </p:cNvPr>
+          <p:cNvSpPr txBox="1"/>
+          <p:nvPr/>
+        </p:nvSpPr>
+        <p:spPr>
+          <a:xfrm>
+            <a:off x="9301082" y="91835"/>
+            <a:ext cx="483007" cy="369332"/>
+          </a:xfrm>
+          <a:prstGeom prst="rect">
+            <a:avLst/>
+          </a:prstGeom>
+          <a:noFill/>
+        </p:spPr>
+        <p:txBody>
+          <a:bodyPr wrap="square">
+            <a:spAutoFit/>
+          </a:bodyPr>
+          <a:lstStyle/>
+          <a:p>
+            <a:r>
+              <a:rPr lang="en-CA" sz="1800" dirty="0">
+                <a:latin typeface="Helvetica" panose="020B0604020202020204" pitchFamily="34" charset="0"/>
+                <a:cs typeface="Helvetica" panose="020B0604020202020204" pitchFamily="34" charset="0"/>
+              </a:rPr>
+              <a:t>*</a:t>
+            </a:r>
+          </a:p>
+        </p:txBody>
+      </p:sp>
+      <p:sp>
+        <p:nvSpPr>
+          <p:cNvPr id="24" name="TextBox 23">
+            <a:extLst>
+              <a:ext uri="{FF2B5EF4-FFF2-40B4-BE49-F238E27FC236}">
+                <a16:creationId xmlns:a16="http://schemas.microsoft.com/office/drawing/2014/main" id="{F065104F-D136-6266-CE64-089571ABB950}"/>
+              </a:ext>
+            </a:extLst>
+          </p:cNvPr>
+          <p:cNvSpPr txBox="1"/>
+          <p:nvPr/>
+        </p:nvSpPr>
+        <p:spPr>
+          <a:xfrm>
+            <a:off x="10288734" y="112840"/>
+            <a:ext cx="483007" cy="261610"/>
+          </a:xfrm>
+          <a:prstGeom prst="rect">
+            <a:avLst/>
+          </a:prstGeom>
+          <a:noFill/>
+        </p:spPr>
+        <p:txBody>
+          <a:bodyPr wrap="square">
+            <a:spAutoFit/>
+          </a:bodyPr>
+          <a:lstStyle/>
+          <a:p>
+            <a:r>
+              <a:rPr lang="en-CA" sz="1100" dirty="0">
+                <a:latin typeface="Helvetica" panose="020B0604020202020204" pitchFamily="34" charset="0"/>
+                <a:cs typeface="Helvetica" panose="020B0604020202020204" pitchFamily="34" charset="0"/>
+              </a:rPr>
+              <a:t>ns</a:t>
+            </a:r>
+          </a:p>
+        </p:txBody>
+      </p:sp>
+    </p:spTree>
+    <p:extLst>
+      <p:ext uri="{BB962C8B-B14F-4D97-AF65-F5344CB8AC3E}">
+        <p14:creationId xmlns:p14="http://schemas.microsoft.com/office/powerpoint/2010/main" val="3355789389"/>
+      </p:ext>
+    </p:extLst>
+  </p:cSld>
+  <p:clrMapOvr>
+    <a:masterClrMapping/>
+  </p:clrMapOvr>
+</p:sld>
+</file>
+
+<file path=ppt/slides/slide13.xml><?xml version="1.0" encoding="utf-8"?>
 <p:sld xmlns:a="http://schemas.openxmlformats.org/drawingml/2006/main" xmlns:r="http://schemas.openxmlformats.org/officeDocument/2006/relationships" xmlns:p="http://schemas.openxmlformats.org/presentationml/2006/main" show="0">
   <p:cSld>
     <p:spTree>
@@ -7278,7 +8454,7 @@
 </p:sld>
 </file>
 
-<file path=ppt/slides/slide13.xml><?xml version="1.0" encoding="utf-8"?>
+<file path=ppt/slides/slide14.xml><?xml version="1.0" encoding="utf-8"?>
 <p:sld xmlns:a="http://schemas.openxmlformats.org/drawingml/2006/main" xmlns:r="http://schemas.openxmlformats.org/officeDocument/2006/relationships" xmlns:p="http://schemas.openxmlformats.org/presentationml/2006/main" show="0">
   <p:cSld>
     <p:spTree>
@@ -9695,7 +10871,7 @@
 </p:sld>
 </file>
 
-<file path=ppt/slides/slide14.xml><?xml version="1.0" encoding="utf-8"?>
+<file path=ppt/slides/slide15.xml><?xml version="1.0" encoding="utf-8"?>
 <p:sld xmlns:a="http://schemas.openxmlformats.org/drawingml/2006/main" xmlns:r="http://schemas.openxmlformats.org/officeDocument/2006/relationships" xmlns:p="http://schemas.openxmlformats.org/presentationml/2006/main" show="0">
   <p:cSld>
     <p:spTree>
@@ -11500,6 +12676,292 @@
           </a:p>
         </p:txBody>
       </p:sp>
+      <p:grpSp>
+        <p:nvGrpSpPr>
+          <p:cNvPr id="14" name="Group 13">
+            <a:extLst>
+              <a:ext uri="{FF2B5EF4-FFF2-40B4-BE49-F238E27FC236}">
+                <a16:creationId xmlns:a16="http://schemas.microsoft.com/office/drawing/2014/main" id="{FD7B0943-263D-2DA2-031D-81445E9A8776}"/>
+              </a:ext>
+            </a:extLst>
+          </p:cNvPr>
+          <p:cNvGrpSpPr/>
+          <p:nvPr/>
+        </p:nvGrpSpPr>
+        <p:grpSpPr>
+          <a:xfrm>
+            <a:off x="523691" y="2753805"/>
+            <a:ext cx="284672" cy="123646"/>
+            <a:chOff x="966158" y="1725283"/>
+            <a:chExt cx="284672" cy="123646"/>
+          </a:xfrm>
+        </p:grpSpPr>
+        <p:cxnSp>
+          <p:nvCxnSpPr>
+            <p:cNvPr id="5" name="Straight Connector 4">
+              <a:extLst>
+                <a:ext uri="{FF2B5EF4-FFF2-40B4-BE49-F238E27FC236}">
+                  <a16:creationId xmlns:a16="http://schemas.microsoft.com/office/drawing/2014/main" id="{7507B44E-F9EE-A2C2-63F9-B05B418E4EFE}"/>
+                </a:ext>
+              </a:extLst>
+            </p:cNvPr>
+            <p:cNvCxnSpPr>
+              <a:cxnSpLocks/>
+            </p:cNvCxnSpPr>
+            <p:nvPr/>
+          </p:nvCxnSpPr>
+          <p:spPr>
+            <a:xfrm>
+              <a:off x="966158" y="1733909"/>
+              <a:ext cx="284672" cy="0"/>
+            </a:xfrm>
+            <a:prstGeom prst="line">
+              <a:avLst/>
+            </a:prstGeom>
+            <a:ln w="28575">
+              <a:solidFill>
+                <a:schemeClr val="tx1"/>
+              </a:solidFill>
+            </a:ln>
+          </p:spPr>
+          <p:style>
+            <a:lnRef idx="1">
+              <a:schemeClr val="accent1"/>
+            </a:lnRef>
+            <a:fillRef idx="0">
+              <a:schemeClr val="accent1"/>
+            </a:fillRef>
+            <a:effectRef idx="0">
+              <a:schemeClr val="accent1"/>
+            </a:effectRef>
+            <a:fontRef idx="minor">
+              <a:schemeClr val="tx1"/>
+            </a:fontRef>
+          </p:style>
+        </p:cxnSp>
+        <p:cxnSp>
+          <p:nvCxnSpPr>
+            <p:cNvPr id="11" name="Straight Connector 10">
+              <a:extLst>
+                <a:ext uri="{FF2B5EF4-FFF2-40B4-BE49-F238E27FC236}">
+                  <a16:creationId xmlns:a16="http://schemas.microsoft.com/office/drawing/2014/main" id="{AAE95527-74D1-1B19-B8B7-1DF2AF9DE63A}"/>
+                </a:ext>
+              </a:extLst>
+            </p:cNvPr>
+            <p:cNvCxnSpPr>
+              <a:cxnSpLocks/>
+            </p:cNvCxnSpPr>
+            <p:nvPr/>
+          </p:nvCxnSpPr>
+          <p:spPr>
+            <a:xfrm>
+              <a:off x="966158" y="1725283"/>
+              <a:ext cx="0" cy="123646"/>
+            </a:xfrm>
+            <a:prstGeom prst="line">
+              <a:avLst/>
+            </a:prstGeom>
+            <a:ln w="28575">
+              <a:solidFill>
+                <a:schemeClr val="tx1"/>
+              </a:solidFill>
+            </a:ln>
+          </p:spPr>
+          <p:style>
+            <a:lnRef idx="1">
+              <a:schemeClr val="accent1"/>
+            </a:lnRef>
+            <a:fillRef idx="0">
+              <a:schemeClr val="accent1"/>
+            </a:fillRef>
+            <a:effectRef idx="0">
+              <a:schemeClr val="accent1"/>
+            </a:effectRef>
+            <a:fontRef idx="minor">
+              <a:schemeClr val="tx1"/>
+            </a:fontRef>
+          </p:style>
+        </p:cxnSp>
+        <p:cxnSp>
+          <p:nvCxnSpPr>
+            <p:cNvPr id="13" name="Straight Connector 12">
+              <a:extLst>
+                <a:ext uri="{FF2B5EF4-FFF2-40B4-BE49-F238E27FC236}">
+                  <a16:creationId xmlns:a16="http://schemas.microsoft.com/office/drawing/2014/main" id="{1B7E2E82-472B-AD92-B427-76E5D863DBBA}"/>
+                </a:ext>
+              </a:extLst>
+            </p:cNvPr>
+            <p:cNvCxnSpPr>
+              <a:cxnSpLocks/>
+            </p:cNvCxnSpPr>
+            <p:nvPr/>
+          </p:nvCxnSpPr>
+          <p:spPr>
+            <a:xfrm>
+              <a:off x="1242204" y="1725283"/>
+              <a:ext cx="0" cy="123646"/>
+            </a:xfrm>
+            <a:prstGeom prst="line">
+              <a:avLst/>
+            </a:prstGeom>
+            <a:ln w="28575">
+              <a:solidFill>
+                <a:schemeClr val="tx1"/>
+              </a:solidFill>
+            </a:ln>
+          </p:spPr>
+          <p:style>
+            <a:lnRef idx="1">
+              <a:schemeClr val="accent1"/>
+            </a:lnRef>
+            <a:fillRef idx="0">
+              <a:schemeClr val="accent1"/>
+            </a:fillRef>
+            <a:effectRef idx="0">
+              <a:schemeClr val="accent1"/>
+            </a:effectRef>
+            <a:fontRef idx="minor">
+              <a:schemeClr val="tx1"/>
+            </a:fontRef>
+          </p:style>
+        </p:cxnSp>
+      </p:grpSp>
+      <p:pic>
+        <p:nvPicPr>
+          <p:cNvPr id="16" name="Picture 15">
+            <a:extLst>
+              <a:ext uri="{FF2B5EF4-FFF2-40B4-BE49-F238E27FC236}">
+                <a16:creationId xmlns:a16="http://schemas.microsoft.com/office/drawing/2014/main" id="{EF6BB9A3-A667-1F76-9BF6-C5FF2495FEB5}"/>
+              </a:ext>
+            </a:extLst>
+          </p:cNvPr>
+          <p:cNvPicPr>
+            <a:picLocks noChangeAspect="1"/>
+          </p:cNvPicPr>
+          <p:nvPr/>
+        </p:nvPicPr>
+        <p:blipFill>
+          <a:blip r:embed="rId9"/>
+          <a:stretch>
+            <a:fillRect/>
+          </a:stretch>
+        </p:blipFill>
+        <p:spPr>
+          <a:xfrm>
+            <a:off x="8789130" y="276560"/>
+            <a:ext cx="527398" cy="227140"/>
+          </a:xfrm>
+          <a:prstGeom prst="rect">
+            <a:avLst/>
+          </a:prstGeom>
+        </p:spPr>
+      </p:pic>
+      <p:sp>
+        <p:nvSpPr>
+          <p:cNvPr id="18" name="TextBox 17">
+            <a:extLst>
+              <a:ext uri="{FF2B5EF4-FFF2-40B4-BE49-F238E27FC236}">
+                <a16:creationId xmlns:a16="http://schemas.microsoft.com/office/drawing/2014/main" id="{27F13BCD-C8E4-726D-0AA8-C64AEC92D730}"/>
+              </a:ext>
+            </a:extLst>
+          </p:cNvPr>
+          <p:cNvSpPr txBox="1"/>
+          <p:nvPr/>
+        </p:nvSpPr>
+        <p:spPr>
+          <a:xfrm>
+            <a:off x="8862015" y="134502"/>
+            <a:ext cx="483007" cy="369332"/>
+          </a:xfrm>
+          <a:prstGeom prst="rect">
+            <a:avLst/>
+          </a:prstGeom>
+          <a:noFill/>
+        </p:spPr>
+        <p:txBody>
+          <a:bodyPr wrap="square">
+            <a:spAutoFit/>
+          </a:bodyPr>
+          <a:lstStyle/>
+          <a:p>
+            <a:r>
+              <a:rPr lang="en-CA" sz="1800" dirty="0">
+                <a:latin typeface="Helvetica" panose="020B0604020202020204" pitchFamily="34" charset="0"/>
+                <a:cs typeface="Helvetica" panose="020B0604020202020204" pitchFamily="34" charset="0"/>
+              </a:rPr>
+              <a:t>**</a:t>
+            </a:r>
+          </a:p>
+        </p:txBody>
+      </p:sp>
+      <p:pic>
+        <p:nvPicPr>
+          <p:cNvPr id="23" name="Picture 22">
+            <a:extLst>
+              <a:ext uri="{FF2B5EF4-FFF2-40B4-BE49-F238E27FC236}">
+                <a16:creationId xmlns:a16="http://schemas.microsoft.com/office/drawing/2014/main" id="{6FDDC377-4D44-8E73-8B0A-902AD1E58E9A}"/>
+              </a:ext>
+            </a:extLst>
+          </p:cNvPr>
+          <p:cNvPicPr>
+            <a:picLocks noChangeAspect="1"/>
+          </p:cNvPicPr>
+          <p:nvPr/>
+        </p:nvPicPr>
+        <p:blipFill>
+          <a:blip r:embed="rId9"/>
+          <a:stretch>
+            <a:fillRect/>
+          </a:stretch>
+        </p:blipFill>
+        <p:spPr>
+          <a:xfrm>
+            <a:off x="9695558" y="1257096"/>
+            <a:ext cx="527398" cy="227140"/>
+          </a:xfrm>
+          <a:prstGeom prst="rect">
+            <a:avLst/>
+          </a:prstGeom>
+        </p:spPr>
+      </p:pic>
+      <p:sp>
+        <p:nvSpPr>
+          <p:cNvPr id="19" name="TextBox 18">
+            <a:extLst>
+              <a:ext uri="{FF2B5EF4-FFF2-40B4-BE49-F238E27FC236}">
+                <a16:creationId xmlns:a16="http://schemas.microsoft.com/office/drawing/2014/main" id="{5A0BFD5A-1104-AE7D-5171-EEBD31EED26D}"/>
+              </a:ext>
+            </a:extLst>
+          </p:cNvPr>
+          <p:cNvSpPr txBox="1"/>
+          <p:nvPr/>
+        </p:nvSpPr>
+        <p:spPr>
+          <a:xfrm>
+            <a:off x="9781350" y="1126291"/>
+            <a:ext cx="483007" cy="261610"/>
+          </a:xfrm>
+          <a:prstGeom prst="rect">
+            <a:avLst/>
+          </a:prstGeom>
+          <a:noFill/>
+        </p:spPr>
+        <p:txBody>
+          <a:bodyPr wrap="square">
+            <a:spAutoFit/>
+          </a:bodyPr>
+          <a:lstStyle/>
+          <a:p>
+            <a:r>
+              <a:rPr lang="en-CA" sz="1100" dirty="0">
+                <a:latin typeface="Helvetica" panose="020B0604020202020204" pitchFamily="34" charset="0"/>
+                <a:cs typeface="Helvetica" panose="020B0604020202020204" pitchFamily="34" charset="0"/>
+              </a:rPr>
+              <a:t>ns</a:t>
+            </a:r>
+          </a:p>
+        </p:txBody>
+      </p:sp>
     </p:spTree>
     <p:extLst>
       <p:ext uri="{BB962C8B-B14F-4D97-AF65-F5344CB8AC3E}">
@@ -11545,36 +13007,6 @@
           <p:nvPr/>
         </p:nvPicPr>
         <p:blipFill>
-          <a:blip r:embed="rId2"/>
-          <a:stretch>
-            <a:fillRect/>
-          </a:stretch>
-        </p:blipFill>
-        <p:spPr>
-          <a:xfrm>
-            <a:off x="2169117" y="3683359"/>
-            <a:ext cx="2472787" cy="2996261"/>
-          </a:xfrm>
-          <a:prstGeom prst="rect">
-            <a:avLst/>
-          </a:prstGeom>
-        </p:spPr>
-      </p:pic>
-      <p:pic>
-        <p:nvPicPr>
-          <p:cNvPr id="7" name="Picture 6">
-            <a:extLst>
-              <a:ext uri="{FF2B5EF4-FFF2-40B4-BE49-F238E27FC236}">
-                <a16:creationId xmlns:a16="http://schemas.microsoft.com/office/drawing/2014/main" id="{092DC6FB-70E5-4184-68C2-5DAE04555E98}"/>
-              </a:ext>
-            </a:extLst>
-          </p:cNvPr>
-          <p:cNvPicPr>
-            <a:picLocks noChangeAspect="1"/>
-          </p:cNvPicPr>
-          <p:nvPr/>
-        </p:nvPicPr>
-        <p:blipFill>
           <a:blip r:embed="rId3"/>
           <a:stretch>
             <a:fillRect/>
@@ -11582,6 +13014,36 @@
         </p:blipFill>
         <p:spPr>
           <a:xfrm>
+            <a:off x="2169117" y="3683359"/>
+            <a:ext cx="2472787" cy="2996261"/>
+          </a:xfrm>
+          <a:prstGeom prst="rect">
+            <a:avLst/>
+          </a:prstGeom>
+        </p:spPr>
+      </p:pic>
+      <p:pic>
+        <p:nvPicPr>
+          <p:cNvPr id="7" name="Picture 6">
+            <a:extLst>
+              <a:ext uri="{FF2B5EF4-FFF2-40B4-BE49-F238E27FC236}">
+                <a16:creationId xmlns:a16="http://schemas.microsoft.com/office/drawing/2014/main" id="{092DC6FB-70E5-4184-68C2-5DAE04555E98}"/>
+              </a:ext>
+            </a:extLst>
+          </p:cNvPr>
+          <p:cNvPicPr>
+            <a:picLocks noChangeAspect="1"/>
+          </p:cNvPicPr>
+          <p:nvPr/>
+        </p:nvPicPr>
+        <p:blipFill>
+          <a:blip r:embed="rId4"/>
+          <a:stretch>
+            <a:fillRect/>
+          </a:stretch>
+        </p:blipFill>
+        <p:spPr>
+          <a:xfrm>
             <a:off x="4590478" y="362490"/>
             <a:ext cx="2547230" cy="3082148"/>
           </a:xfrm>
@@ -11605,7 +13067,7 @@
           <p:nvPr/>
         </p:nvPicPr>
         <p:blipFill>
-          <a:blip r:embed="rId4"/>
+          <a:blip r:embed="rId5"/>
           <a:stretch>
             <a:fillRect/>
           </a:stretch>
@@ -11961,7 +13423,7 @@
             <p:nvPr/>
           </p:nvPicPr>
           <p:blipFill rotWithShape="1">
-            <a:blip r:embed="rId5"/>
+            <a:blip r:embed="rId6"/>
             <a:srcRect l="3021" t="1714" r="3955" b="1896"/>
             <a:stretch/>
           </p:blipFill>
@@ -11990,7 +13452,7 @@
             <p:nvPr/>
           </p:nvPicPr>
           <p:blipFill>
-            <a:blip r:embed="rId6"/>
+            <a:blip r:embed="rId7"/>
             <a:stretch>
               <a:fillRect/>
             </a:stretch>
@@ -12109,7 +13571,7 @@
           <p:nvPr/>
         </p:nvPicPr>
         <p:blipFill rotWithShape="1">
-          <a:blip r:embed="rId7"/>
+          <a:blip r:embed="rId8"/>
           <a:srcRect b="6319"/>
           <a:stretch/>
         </p:blipFill>
@@ -12270,7 +13732,7 @@
           <p:nvPr/>
         </p:nvPicPr>
         <p:blipFill>
-          <a:blip r:embed="rId6"/>
+          <a:blip r:embed="rId7"/>
           <a:stretch>
             <a:fillRect/>
           </a:stretch>
@@ -12300,7 +13762,7 @@
           <p:nvPr/>
         </p:nvPicPr>
         <p:blipFill>
-          <a:blip r:embed="rId6"/>
+          <a:blip r:embed="rId7"/>
           <a:stretch>
             <a:fillRect/>
           </a:stretch>
@@ -12391,6 +13853,219 @@
           </a:p>
         </p:txBody>
       </p:sp>
+      <p:pic>
+        <p:nvPicPr>
+          <p:cNvPr id="111" name="Picture 110">
+            <a:extLst>
+              <a:ext uri="{FF2B5EF4-FFF2-40B4-BE49-F238E27FC236}">
+                <a16:creationId xmlns:a16="http://schemas.microsoft.com/office/drawing/2014/main" id="{EFA4D1EF-FB5B-09D3-92BE-C91C6E504959}"/>
+              </a:ext>
+            </a:extLst>
+          </p:cNvPr>
+          <p:cNvPicPr>
+            <a:picLocks noChangeAspect="1"/>
+          </p:cNvPicPr>
+          <p:nvPr/>
+        </p:nvPicPr>
+        <p:blipFill rotWithShape="1">
+          <a:blip r:embed="rId7"/>
+          <a:srcRect t="47827"/>
+          <a:stretch/>
+        </p:blipFill>
+        <p:spPr>
+          <a:xfrm>
+            <a:off x="8484976" y="1000523"/>
+            <a:ext cx="1260509" cy="155965"/>
+          </a:xfrm>
+          <a:prstGeom prst="rect">
+            <a:avLst/>
+          </a:prstGeom>
+        </p:spPr>
+      </p:pic>
+      <p:pic>
+        <p:nvPicPr>
+          <p:cNvPr id="116" name="Picture 115">
+            <a:extLst>
+              <a:ext uri="{FF2B5EF4-FFF2-40B4-BE49-F238E27FC236}">
+                <a16:creationId xmlns:a16="http://schemas.microsoft.com/office/drawing/2014/main" id="{BB07EDCF-B703-6D8F-3A67-A907ED815735}"/>
+              </a:ext>
+            </a:extLst>
+          </p:cNvPr>
+          <p:cNvPicPr>
+            <a:picLocks noChangeAspect="1"/>
+          </p:cNvPicPr>
+          <p:nvPr/>
+        </p:nvPicPr>
+        <p:blipFill rotWithShape="1">
+          <a:blip r:embed="rId7"/>
+          <a:srcRect t="47827"/>
+          <a:stretch/>
+        </p:blipFill>
+        <p:spPr>
+          <a:xfrm>
+            <a:off x="8132452" y="454853"/>
+            <a:ext cx="1128125" cy="128345"/>
+          </a:xfrm>
+          <a:prstGeom prst="rect">
+            <a:avLst/>
+          </a:prstGeom>
+        </p:spPr>
+      </p:pic>
+      <p:cxnSp>
+        <p:nvCxnSpPr>
+          <p:cNvPr id="133" name="Straight Connector 132">
+            <a:extLst>
+              <a:ext uri="{FF2B5EF4-FFF2-40B4-BE49-F238E27FC236}">
+                <a16:creationId xmlns:a16="http://schemas.microsoft.com/office/drawing/2014/main" id="{ABDF116F-8E54-897A-FB0F-944BA27D4742}"/>
+              </a:ext>
+            </a:extLst>
+          </p:cNvPr>
+          <p:cNvCxnSpPr>
+            <a:cxnSpLocks/>
+          </p:cNvCxnSpPr>
+          <p:nvPr/>
+        </p:nvCxnSpPr>
+        <p:spPr>
+          <a:xfrm>
+            <a:off x="9226073" y="356140"/>
+            <a:ext cx="0" cy="663911"/>
+          </a:xfrm>
+          <a:prstGeom prst="line">
+            <a:avLst/>
+          </a:prstGeom>
+          <a:ln w="19050"/>
+        </p:spPr>
+        <p:style>
+          <a:lnRef idx="1">
+            <a:schemeClr val="dk1"/>
+          </a:lnRef>
+          <a:fillRef idx="0">
+            <a:schemeClr val="dk1"/>
+          </a:fillRef>
+          <a:effectRef idx="0">
+            <a:schemeClr val="dk1"/>
+          </a:effectRef>
+          <a:fontRef idx="minor">
+            <a:schemeClr val="tx1"/>
+          </a:fontRef>
+        </p:style>
+      </p:cxnSp>
+      <p:cxnSp>
+        <p:nvCxnSpPr>
+          <p:cNvPr id="135" name="Straight Connector 134">
+            <a:extLst>
+              <a:ext uri="{FF2B5EF4-FFF2-40B4-BE49-F238E27FC236}">
+                <a16:creationId xmlns:a16="http://schemas.microsoft.com/office/drawing/2014/main" id="{B9F391D3-038B-81D6-7B00-8B1A8AD9F1EA}"/>
+              </a:ext>
+            </a:extLst>
+          </p:cNvPr>
+          <p:cNvCxnSpPr>
+            <a:cxnSpLocks/>
+          </p:cNvCxnSpPr>
+          <p:nvPr/>
+        </p:nvCxnSpPr>
+        <p:spPr>
+          <a:xfrm>
+            <a:off x="8629906" y="353864"/>
+            <a:ext cx="596167" cy="0"/>
+          </a:xfrm>
+          <a:prstGeom prst="line">
+            <a:avLst/>
+          </a:prstGeom>
+          <a:ln w="19050"/>
+        </p:spPr>
+        <p:style>
+          <a:lnRef idx="1">
+            <a:schemeClr val="dk1"/>
+          </a:lnRef>
+          <a:fillRef idx="0">
+            <a:schemeClr val="dk1"/>
+          </a:fillRef>
+          <a:effectRef idx="0">
+            <a:schemeClr val="dk1"/>
+          </a:effectRef>
+          <a:fontRef idx="minor">
+            <a:schemeClr val="tx1"/>
+          </a:fontRef>
+        </p:style>
+      </p:cxnSp>
+      <p:cxnSp>
+        <p:nvCxnSpPr>
+          <p:cNvPr id="138" name="Straight Connector 137">
+            <a:extLst>
+              <a:ext uri="{FF2B5EF4-FFF2-40B4-BE49-F238E27FC236}">
+                <a16:creationId xmlns:a16="http://schemas.microsoft.com/office/drawing/2014/main" id="{CA4F44C0-FDB0-3A9D-4714-C37AC6D2157E}"/>
+              </a:ext>
+            </a:extLst>
+          </p:cNvPr>
+          <p:cNvCxnSpPr>
+            <a:cxnSpLocks/>
+          </p:cNvCxnSpPr>
+          <p:nvPr/>
+        </p:nvCxnSpPr>
+        <p:spPr>
+          <a:xfrm>
+            <a:off x="8629906" y="347514"/>
+            <a:ext cx="0" cy="118241"/>
+          </a:xfrm>
+          <a:prstGeom prst="line">
+            <a:avLst/>
+          </a:prstGeom>
+          <a:ln w="19050"/>
+        </p:spPr>
+        <p:style>
+          <a:lnRef idx="1">
+            <a:schemeClr val="dk1"/>
+          </a:lnRef>
+          <a:fillRef idx="0">
+            <a:schemeClr val="dk1"/>
+          </a:fillRef>
+          <a:effectRef idx="0">
+            <a:schemeClr val="dk1"/>
+          </a:effectRef>
+          <a:fontRef idx="minor">
+            <a:schemeClr val="tx1"/>
+          </a:fontRef>
+        </p:style>
+      </p:cxnSp>
+      <p:sp>
+        <p:nvSpPr>
+          <p:cNvPr id="151" name="TextBox 150">
+            <a:extLst>
+              <a:ext uri="{FF2B5EF4-FFF2-40B4-BE49-F238E27FC236}">
+                <a16:creationId xmlns:a16="http://schemas.microsoft.com/office/drawing/2014/main" id="{0590DF01-A277-7BD7-3042-7325346B89DD}"/>
+              </a:ext>
+            </a:extLst>
+          </p:cNvPr>
+          <p:cNvSpPr txBox="1"/>
+          <p:nvPr/>
+        </p:nvSpPr>
+        <p:spPr>
+          <a:xfrm>
+            <a:off x="8753867" y="136637"/>
+            <a:ext cx="722725" cy="307777"/>
+          </a:xfrm>
+          <a:prstGeom prst="rect">
+            <a:avLst/>
+          </a:prstGeom>
+          <a:noFill/>
+        </p:spPr>
+        <p:txBody>
+          <a:bodyPr wrap="square" rtlCol="0">
+            <a:spAutoFit/>
+          </a:bodyPr>
+          <a:lstStyle/>
+          <a:p>
+            <a:r>
+              <a:rPr lang="en-CA" sz="1400" dirty="0">
+                <a:latin typeface="Helvetica" panose="020B0604020202020204" pitchFamily="34" charset="0"/>
+                <a:cs typeface="Helvetica" panose="020B0604020202020204" pitchFamily="34" charset="0"/>
+              </a:rPr>
+              <a:t>**</a:t>
+            </a:r>
+          </a:p>
+        </p:txBody>
+      </p:sp>
     </p:spTree>
     <p:extLst>
       <p:ext uri="{BB962C8B-B14F-4D97-AF65-F5344CB8AC3E}">
@@ -12401,6 +14076,11 @@
   <p:clrMapOvr>
     <a:masterClrMapping/>
   </p:clrMapOvr>
+  <p:extLst>
+    <p:ext uri="{6950BFC3-D8DA-4A85-94F7-54DA5524770B}">
+      <p188:commentRel xmlns:p188="http://schemas.microsoft.com/office/powerpoint/2018/8/main" r:id="rId2"/>
+    </p:ext>
+  </p:extLst>
 </p:sld>
 </file>
 
@@ -12409,7 +14089,13 @@
   <p:cSld>
     <p:spTree>
       <p:nvGrpSpPr>
-        <p:cNvPr id="1" name=""/>
+        <p:cNvPr id="1" name="">
+          <a:extLst>
+            <a:ext uri="{FF2B5EF4-FFF2-40B4-BE49-F238E27FC236}">
+              <a16:creationId xmlns:a16="http://schemas.microsoft.com/office/drawing/2014/main" id="{CE8A3694-A59A-9B8B-CD00-A95ECF8C2388}"/>
+            </a:ext>
+          </a:extLst>
+        </p:cNvPr>
         <p:cNvGrpSpPr/>
         <p:nvPr/>
       </p:nvGrpSpPr>
@@ -12426,7 +14112,7 @@
           <p:cNvPr id="14" name="Group 13">
             <a:extLst>
               <a:ext uri="{FF2B5EF4-FFF2-40B4-BE49-F238E27FC236}">
-                <a16:creationId xmlns:a16="http://schemas.microsoft.com/office/drawing/2014/main" id="{7B418429-3B8E-FF7E-E5DA-64CE3B9466C5}"/>
+                <a16:creationId xmlns:a16="http://schemas.microsoft.com/office/drawing/2014/main" id="{2438F5E6-8FE6-234D-CB5B-F5A410591920}"/>
               </a:ext>
             </a:extLst>
           </p:cNvPr>
@@ -12435,7 +14121,7 @@
         </p:nvGrpSpPr>
         <p:grpSpPr>
           <a:xfrm>
-            <a:off x="8091599" y="293084"/>
+            <a:off x="8217081" y="278805"/>
             <a:ext cx="2507672" cy="3312980"/>
             <a:chOff x="8091599" y="293084"/>
             <a:chExt cx="2507672" cy="3312980"/>
@@ -12446,7 +14132,7 @@
             <p:cNvPr id="11" name="Picture 10">
               <a:extLst>
                 <a:ext uri="{FF2B5EF4-FFF2-40B4-BE49-F238E27FC236}">
-                  <a16:creationId xmlns:a16="http://schemas.microsoft.com/office/drawing/2014/main" id="{8FB53F06-B1F5-DB78-9169-7E394F6D3681}"/>
+                  <a16:creationId xmlns:a16="http://schemas.microsoft.com/office/drawing/2014/main" id="{97D2E48F-7B44-1414-1AA8-587CF97B949D}"/>
                 </a:ext>
               </a:extLst>
             </p:cNvPr>
@@ -12476,7 +14162,7 @@
             <p:cNvPr id="12" name="TextBox 11">
               <a:extLst>
                 <a:ext uri="{FF2B5EF4-FFF2-40B4-BE49-F238E27FC236}">
-                  <a16:creationId xmlns:a16="http://schemas.microsoft.com/office/drawing/2014/main" id="{2DB1A470-4919-F56A-C803-52D4530F26D3}"/>
+                  <a16:creationId xmlns:a16="http://schemas.microsoft.com/office/drawing/2014/main" id="{7E797AD4-B553-707B-A401-A198E0EB39DE}"/>
                 </a:ext>
               </a:extLst>
             </p:cNvPr>
@@ -12514,7 +14200,7 @@
             <p:cNvPr id="13" name="TextBox 12">
               <a:extLst>
                 <a:ext uri="{FF2B5EF4-FFF2-40B4-BE49-F238E27FC236}">
-                  <a16:creationId xmlns:a16="http://schemas.microsoft.com/office/drawing/2014/main" id="{B04F6C46-C349-B515-48DC-66BF78F09759}"/>
+                  <a16:creationId xmlns:a16="http://schemas.microsoft.com/office/drawing/2014/main" id="{8F047B7E-ED97-A35D-3C88-83E80AE5699E}"/>
                 </a:ext>
               </a:extLst>
             </p:cNvPr>
@@ -12550,10 +14236,10 @@
       </p:grpSp>
       <p:pic>
         <p:nvPicPr>
-          <p:cNvPr id="44" name="Picture 43">
-            <a:extLst>
-              <a:ext uri="{FF2B5EF4-FFF2-40B4-BE49-F238E27FC236}">
-                <a16:creationId xmlns:a16="http://schemas.microsoft.com/office/drawing/2014/main" id="{9A7ECACD-9E20-4237-A1E6-F1CCCED8A379}"/>
+          <p:cNvPr id="33" name="Picture 32">
+            <a:extLst>
+              <a:ext uri="{FF2B5EF4-FFF2-40B4-BE49-F238E27FC236}">
+                <a16:creationId xmlns:a16="http://schemas.microsoft.com/office/drawing/2014/main" id="{64D93190-E02B-2EF6-BEB2-FFFFEE5F15B2}"/>
               </a:ext>
             </a:extLst>
           </p:cNvPr>
@@ -12570,8 +14256,8 @@
         </p:blipFill>
         <p:spPr>
           <a:xfrm>
-            <a:off x="2349272" y="3737839"/>
-            <a:ext cx="2530356" cy="3109162"/>
+            <a:off x="5255115" y="327013"/>
+            <a:ext cx="2686866" cy="3212440"/>
           </a:xfrm>
           <a:prstGeom prst="rect">
             <a:avLst/>
@@ -12580,10 +14266,10 @@
       </p:pic>
       <p:pic>
         <p:nvPicPr>
-          <p:cNvPr id="33" name="Picture 32">
-            <a:extLst>
-              <a:ext uri="{FF2B5EF4-FFF2-40B4-BE49-F238E27FC236}">
-                <a16:creationId xmlns:a16="http://schemas.microsoft.com/office/drawing/2014/main" id="{DD6B970F-3AE4-3509-3BBD-89470EEBE01F}"/>
+          <p:cNvPr id="23" name="Picture 22">
+            <a:extLst>
+              <a:ext uri="{FF2B5EF4-FFF2-40B4-BE49-F238E27FC236}">
+                <a16:creationId xmlns:a16="http://schemas.microsoft.com/office/drawing/2014/main" id="{1226D961-45DB-764B-574F-431B6A54DEA7}"/>
               </a:ext>
             </a:extLst>
           </p:cNvPr>
@@ -12600,36 +14286,6 @@
         </p:blipFill>
         <p:spPr>
           <a:xfrm>
-            <a:off x="4919063" y="315157"/>
-            <a:ext cx="2686866" cy="3212440"/>
-          </a:xfrm>
-          <a:prstGeom prst="rect">
-            <a:avLst/>
-          </a:prstGeom>
-        </p:spPr>
-      </p:pic>
-      <p:pic>
-        <p:nvPicPr>
-          <p:cNvPr id="23" name="Picture 22">
-            <a:extLst>
-              <a:ext uri="{FF2B5EF4-FFF2-40B4-BE49-F238E27FC236}">
-                <a16:creationId xmlns:a16="http://schemas.microsoft.com/office/drawing/2014/main" id="{D9D837A1-52FF-1993-630D-737B4D5D128C}"/>
-              </a:ext>
-            </a:extLst>
-          </p:cNvPr>
-          <p:cNvPicPr>
-            <a:picLocks noChangeAspect="1"/>
-          </p:cNvPicPr>
-          <p:nvPr/>
-        </p:nvPicPr>
-        <p:blipFill>
-          <a:blip r:embed="rId5"/>
-          <a:stretch>
-            <a:fillRect/>
-          </a:stretch>
-        </p:blipFill>
-        <p:spPr>
-          <a:xfrm>
             <a:off x="1972014" y="293084"/>
             <a:ext cx="2717890" cy="3246369"/>
           </a:xfrm>
@@ -12643,7 +14299,7 @@
           <p:cNvPr id="35" name="TextBox 34">
             <a:extLst>
               <a:ext uri="{FF2B5EF4-FFF2-40B4-BE49-F238E27FC236}">
-                <a16:creationId xmlns:a16="http://schemas.microsoft.com/office/drawing/2014/main" id="{9BDD70AF-2141-D8D8-829C-8E0098FBAEB1}"/>
+                <a16:creationId xmlns:a16="http://schemas.microsoft.com/office/drawing/2014/main" id="{E5511E0F-D424-62A3-5819-EB27F37DD55F}"/>
               </a:ext>
             </a:extLst>
           </p:cNvPr>
@@ -12681,7 +14337,7 @@
           <p:cNvPr id="37" name="TextBox 36">
             <a:extLst>
               <a:ext uri="{FF2B5EF4-FFF2-40B4-BE49-F238E27FC236}">
-                <a16:creationId xmlns:a16="http://schemas.microsoft.com/office/drawing/2014/main" id="{A6D8CB02-B6E1-A30C-DD0E-ECDA52F1D6D0}"/>
+                <a16:creationId xmlns:a16="http://schemas.microsoft.com/office/drawing/2014/main" id="{2568C361-A0ED-D779-A0AF-2DCE782FA617}"/>
               </a:ext>
             </a:extLst>
           </p:cNvPr>
@@ -12690,7 +14346,7 @@
         </p:nvSpPr>
         <p:spPr>
           <a:xfrm>
-            <a:off x="4830394" y="34316"/>
+            <a:off x="5166446" y="46172"/>
             <a:ext cx="402674" cy="369332"/>
           </a:xfrm>
           <a:prstGeom prst="rect">
@@ -12719,7 +14375,7 @@
           <p:cNvPr id="38" name="TextBox 37">
             <a:extLst>
               <a:ext uri="{FF2B5EF4-FFF2-40B4-BE49-F238E27FC236}">
-                <a16:creationId xmlns:a16="http://schemas.microsoft.com/office/drawing/2014/main" id="{BDCA46F9-2BAC-D33F-CE14-8141568EAA3F}"/>
+                <a16:creationId xmlns:a16="http://schemas.microsoft.com/office/drawing/2014/main" id="{56DFB2F7-0977-DBEA-325F-28B0285BD41E}"/>
               </a:ext>
             </a:extLst>
           </p:cNvPr>
@@ -12728,7 +14384,7 @@
         </p:nvSpPr>
         <p:spPr>
           <a:xfrm>
-            <a:off x="7959723" y="58979"/>
+            <a:off x="8085205" y="53326"/>
             <a:ext cx="389850" cy="369332"/>
           </a:xfrm>
           <a:prstGeom prst="rect">
@@ -12757,7 +14413,7 @@
           <p:cNvPr id="2" name="Picture 1">
             <a:extLst>
               <a:ext uri="{FF2B5EF4-FFF2-40B4-BE49-F238E27FC236}">
-                <a16:creationId xmlns:a16="http://schemas.microsoft.com/office/drawing/2014/main" id="{92095A55-61E0-4329-B320-7D9BCA810BD3}"/>
+                <a16:creationId xmlns:a16="http://schemas.microsoft.com/office/drawing/2014/main" id="{C3AA4A29-D755-E7CE-92FF-97934013E037}"/>
               </a:ext>
             </a:extLst>
           </p:cNvPr>
@@ -12767,14 +14423,14 @@
           <p:nvPr/>
         </p:nvPicPr>
         <p:blipFill>
-          <a:blip r:embed="rId6"/>
+          <a:blip r:embed="rId5"/>
           <a:stretch>
             <a:fillRect/>
           </a:stretch>
         </p:blipFill>
         <p:spPr>
           <a:xfrm rot="16200000">
-            <a:off x="5057417" y="3513543"/>
+            <a:off x="8129780" y="3532152"/>
             <a:ext cx="3013018" cy="3027620"/>
           </a:xfrm>
           <a:prstGeom prst="rect">
@@ -12787,7 +14443,7 @@
           <p:cNvPr id="3" name="Group 2">
             <a:extLst>
               <a:ext uri="{FF2B5EF4-FFF2-40B4-BE49-F238E27FC236}">
-                <a16:creationId xmlns:a16="http://schemas.microsoft.com/office/drawing/2014/main" id="{78E82448-D15C-B450-D32E-712764E23B6A}"/>
+                <a16:creationId xmlns:a16="http://schemas.microsoft.com/office/drawing/2014/main" id="{2F24D8D0-F435-5406-316A-EB422F40B351}"/>
               </a:ext>
             </a:extLst>
           </p:cNvPr>
@@ -12796,7 +14452,7 @@
         </p:nvGrpSpPr>
         <p:grpSpPr>
           <a:xfrm>
-            <a:off x="6563926" y="5617274"/>
+            <a:off x="9636289" y="5635883"/>
             <a:ext cx="1730444" cy="916588"/>
             <a:chOff x="8151970" y="3700630"/>
             <a:chExt cx="1730444" cy="916588"/>
@@ -12807,7 +14463,7 @@
             <p:cNvPr id="4" name="Oval 3">
               <a:extLst>
                 <a:ext uri="{FF2B5EF4-FFF2-40B4-BE49-F238E27FC236}">
-                  <a16:creationId xmlns:a16="http://schemas.microsoft.com/office/drawing/2014/main" id="{B89066EF-A063-E23D-B803-CD6678F29AEE}"/>
+                  <a16:creationId xmlns:a16="http://schemas.microsoft.com/office/drawing/2014/main" id="{B9613275-FA56-9079-5F02-274F16B43AF0}"/>
                 </a:ext>
               </a:extLst>
             </p:cNvPr>
@@ -12864,7 +14520,7 @@
             <p:cNvPr id="5" name="Oval 4">
               <a:extLst>
                 <a:ext uri="{FF2B5EF4-FFF2-40B4-BE49-F238E27FC236}">
-                  <a16:creationId xmlns:a16="http://schemas.microsoft.com/office/drawing/2014/main" id="{FAB00F24-AF37-38F1-DBBA-9D95166EA524}"/>
+                  <a16:creationId xmlns:a16="http://schemas.microsoft.com/office/drawing/2014/main" id="{D7A0AE00-8101-5634-5410-B713BCDEDEEE}"/>
                 </a:ext>
               </a:extLst>
             </p:cNvPr>
@@ -12921,7 +14577,7 @@
             <p:cNvPr id="6" name="Oval 5">
               <a:extLst>
                 <a:ext uri="{FF2B5EF4-FFF2-40B4-BE49-F238E27FC236}">
-                  <a16:creationId xmlns:a16="http://schemas.microsoft.com/office/drawing/2014/main" id="{2951DF17-7B32-8388-87A4-306436F9A052}"/>
+                  <a16:creationId xmlns:a16="http://schemas.microsoft.com/office/drawing/2014/main" id="{33422CD7-104F-F2FF-2101-9CC14E463A32}"/>
                 </a:ext>
               </a:extLst>
             </p:cNvPr>
@@ -12978,7 +14634,7 @@
             <p:cNvPr id="7" name="TextBox 6">
               <a:extLst>
                 <a:ext uri="{FF2B5EF4-FFF2-40B4-BE49-F238E27FC236}">
-                  <a16:creationId xmlns:a16="http://schemas.microsoft.com/office/drawing/2014/main" id="{C71A3A39-8F55-D52B-6159-89472422DC37}"/>
+                  <a16:creationId xmlns:a16="http://schemas.microsoft.com/office/drawing/2014/main" id="{5B4AA5AE-9D20-53B4-9C1C-AFE29CB55BAD}"/>
                 </a:ext>
               </a:extLst>
             </p:cNvPr>
@@ -13016,7 +14672,7 @@
             <p:cNvPr id="8" name="TextBox 7">
               <a:extLst>
                 <a:ext uri="{FF2B5EF4-FFF2-40B4-BE49-F238E27FC236}">
-                  <a16:creationId xmlns:a16="http://schemas.microsoft.com/office/drawing/2014/main" id="{0C69F0BF-36DD-AF86-2FB3-D6EAB38E0556}"/>
+                  <a16:creationId xmlns:a16="http://schemas.microsoft.com/office/drawing/2014/main" id="{CF4AD84A-8F46-585D-EB35-301B394B1B14}"/>
                 </a:ext>
               </a:extLst>
             </p:cNvPr>
@@ -13054,7 +14710,7 @@
             <p:cNvPr id="9" name="TextBox 8">
               <a:extLst>
                 <a:ext uri="{FF2B5EF4-FFF2-40B4-BE49-F238E27FC236}">
-                  <a16:creationId xmlns:a16="http://schemas.microsoft.com/office/drawing/2014/main" id="{2EBB8F86-C0C0-F1FC-CE3C-327B2E36E056}"/>
+                  <a16:creationId xmlns:a16="http://schemas.microsoft.com/office/drawing/2014/main" id="{FBC0FA76-5775-C632-EEE1-38B264B2AC37}"/>
                 </a:ext>
               </a:extLst>
             </p:cNvPr>
@@ -13093,7 +14749,37 @@
           <p:cNvPr id="20" name="Picture 19">
             <a:extLst>
               <a:ext uri="{FF2B5EF4-FFF2-40B4-BE49-F238E27FC236}">
-                <a16:creationId xmlns:a16="http://schemas.microsoft.com/office/drawing/2014/main" id="{BFF7258C-908C-93CA-6B25-7C88D0D99E60}"/>
+                <a16:creationId xmlns:a16="http://schemas.microsoft.com/office/drawing/2014/main" id="{42FDE4C0-4C0E-1B99-6A47-0C4D6E9A047F}"/>
+              </a:ext>
+            </a:extLst>
+          </p:cNvPr>
+          <p:cNvPicPr>
+            <a:picLocks noChangeAspect="1"/>
+          </p:cNvPicPr>
+          <p:nvPr/>
+        </p:nvPicPr>
+        <p:blipFill>
+          <a:blip r:embed="rId6"/>
+          <a:stretch>
+            <a:fillRect/>
+          </a:stretch>
+        </p:blipFill>
+        <p:spPr>
+          <a:xfrm>
+            <a:off x="3085228" y="53326"/>
+            <a:ext cx="1159788" cy="414679"/>
+          </a:xfrm>
+          <a:prstGeom prst="rect">
+            <a:avLst/>
+          </a:prstGeom>
+        </p:spPr>
+      </p:pic>
+      <p:pic>
+        <p:nvPicPr>
+          <p:cNvPr id="44" name="Picture 43">
+            <a:extLst>
+              <a:ext uri="{FF2B5EF4-FFF2-40B4-BE49-F238E27FC236}">
+                <a16:creationId xmlns:a16="http://schemas.microsoft.com/office/drawing/2014/main" id="{141B5743-E485-8283-99CB-20EE0C52F4B4}"/>
               </a:ext>
             </a:extLst>
           </p:cNvPr>
@@ -13110,8 +14796,8 @@
         </p:blipFill>
         <p:spPr>
           <a:xfrm>
-            <a:off x="3085228" y="53326"/>
-            <a:ext cx="1159788" cy="414679"/>
+            <a:off x="2349272" y="3711961"/>
+            <a:ext cx="2530356" cy="3109162"/>
           </a:xfrm>
           <a:prstGeom prst="rect">
             <a:avLst/>
@@ -13123,7 +14809,7 @@
           <p:cNvPr id="36" name="Picture 35">
             <a:extLst>
               <a:ext uri="{FF2B5EF4-FFF2-40B4-BE49-F238E27FC236}">
-                <a16:creationId xmlns:a16="http://schemas.microsoft.com/office/drawing/2014/main" id="{E5F364F9-D7F8-C2E2-5153-351C2D7949B2}"/>
+                <a16:creationId xmlns:a16="http://schemas.microsoft.com/office/drawing/2014/main" id="{B3AC647F-DFA7-87E9-9E6C-7B84C9639D82}"/>
               </a:ext>
             </a:extLst>
           </p:cNvPr>
@@ -13133,13 +14819,13 @@
           <p:nvPr/>
         </p:nvPicPr>
         <p:blipFill rotWithShape="1">
-          <a:blip r:embed="rId7"/>
+          <a:blip r:embed="rId6"/>
           <a:srcRect t="10935"/>
           <a:stretch/>
         </p:blipFill>
         <p:spPr>
           <a:xfrm>
-            <a:off x="6022148" y="31384"/>
+            <a:off x="6358200" y="43240"/>
             <a:ext cx="1159788" cy="369332"/>
           </a:xfrm>
           <a:prstGeom prst="rect">
@@ -13152,7 +14838,7 @@
           <p:cNvPr id="45" name="Picture 44">
             <a:extLst>
               <a:ext uri="{FF2B5EF4-FFF2-40B4-BE49-F238E27FC236}">
-                <a16:creationId xmlns:a16="http://schemas.microsoft.com/office/drawing/2014/main" id="{532DB935-83FE-FE49-1757-7B89882AA33B}"/>
+                <a16:creationId xmlns:a16="http://schemas.microsoft.com/office/drawing/2014/main" id="{8FDE3BA3-B257-E1BC-1998-0DF30AE2418F}"/>
               </a:ext>
             </a:extLst>
           </p:cNvPr>
@@ -13162,13 +14848,13 @@
           <p:nvPr/>
         </p:nvPicPr>
         <p:blipFill rotWithShape="1">
-          <a:blip r:embed="rId7"/>
+          <a:blip r:embed="rId6"/>
           <a:srcRect t="10935"/>
           <a:stretch/>
         </p:blipFill>
         <p:spPr>
           <a:xfrm>
-            <a:off x="3198655" y="3539453"/>
+            <a:off x="3198655" y="3513575"/>
             <a:ext cx="1159788" cy="355228"/>
           </a:xfrm>
           <a:prstGeom prst="rect">
@@ -13181,7 +14867,7 @@
           <p:cNvPr id="46" name="TextBox 45">
             <a:extLst>
               <a:ext uri="{FF2B5EF4-FFF2-40B4-BE49-F238E27FC236}">
-                <a16:creationId xmlns:a16="http://schemas.microsoft.com/office/drawing/2014/main" id="{203413DA-A5F2-9994-7213-77F51D3EE326}"/>
+                <a16:creationId xmlns:a16="http://schemas.microsoft.com/office/drawing/2014/main" id="{1B82A444-2073-0AA4-247F-C1199F4E5402}"/>
               </a:ext>
             </a:extLst>
           </p:cNvPr>
@@ -13219,7 +14905,7 @@
           <p:cNvPr id="47" name="TextBox 46">
             <a:extLst>
               <a:ext uri="{FF2B5EF4-FFF2-40B4-BE49-F238E27FC236}">
-                <a16:creationId xmlns:a16="http://schemas.microsoft.com/office/drawing/2014/main" id="{3C40B85C-7741-0C6A-AABC-55F80FECAB64}"/>
+                <a16:creationId xmlns:a16="http://schemas.microsoft.com/office/drawing/2014/main" id="{80058702-3809-63C6-881C-9DB1612DAF80}"/>
               </a:ext>
             </a:extLst>
           </p:cNvPr>
@@ -13228,8 +14914,8 @@
         </p:nvSpPr>
         <p:spPr>
           <a:xfrm>
-            <a:off x="5140474" y="3545597"/>
-            <a:ext cx="389850" cy="369332"/>
+            <a:off x="8116987" y="3564175"/>
+            <a:ext cx="338554" cy="369332"/>
           </a:xfrm>
           <a:prstGeom prst="rect">
             <a:avLst/>
@@ -13253,15 +14939,270 @@
                 <a:latin typeface="Helvetica" panose="020B0604020202020204" pitchFamily="34" charset="0"/>
                 <a:cs typeface="Helvetica" panose="020B0604020202020204" pitchFamily="34" charset="0"/>
               </a:rPr>
-              <a:t>e)</a:t>
+              <a:t>f)</a:t>
             </a:r>
           </a:p>
         </p:txBody>
       </p:sp>
+      <p:grpSp>
+        <p:nvGrpSpPr>
+          <p:cNvPr id="10" name="Group 9">
+            <a:extLst>
+              <a:ext uri="{FF2B5EF4-FFF2-40B4-BE49-F238E27FC236}">
+                <a16:creationId xmlns:a16="http://schemas.microsoft.com/office/drawing/2014/main" id="{03ACE082-9944-3EB2-F631-DE5768348C84}"/>
+              </a:ext>
+            </a:extLst>
+          </p:cNvPr>
+          <p:cNvGrpSpPr/>
+          <p:nvPr/>
+        </p:nvGrpSpPr>
+        <p:grpSpPr>
+          <a:xfrm>
+            <a:off x="5082919" y="3549435"/>
+            <a:ext cx="2744548" cy="3336462"/>
+            <a:chOff x="8035811" y="3340417"/>
+            <a:chExt cx="2861522" cy="3526871"/>
+          </a:xfrm>
+        </p:grpSpPr>
+        <p:pic>
+          <p:nvPicPr>
+            <p:cNvPr id="15" name="Picture 14">
+              <a:extLst>
+                <a:ext uri="{FF2B5EF4-FFF2-40B4-BE49-F238E27FC236}">
+                  <a16:creationId xmlns:a16="http://schemas.microsoft.com/office/drawing/2014/main" id="{E08FF440-DCA7-D970-60C8-A20AB67302CC}"/>
+                </a:ext>
+              </a:extLst>
+            </p:cNvPr>
+            <p:cNvPicPr>
+              <a:picLocks noChangeAspect="1"/>
+            </p:cNvPicPr>
+            <p:nvPr/>
+          </p:nvPicPr>
+          <p:blipFill>
+            <a:blip r:embed="rId8"/>
+            <a:stretch>
+              <a:fillRect/>
+            </a:stretch>
+          </p:blipFill>
+          <p:spPr>
+            <a:xfrm>
+              <a:off x="8155378" y="3536758"/>
+              <a:ext cx="2741955" cy="3081774"/>
+            </a:xfrm>
+            <a:prstGeom prst="rect">
+              <a:avLst/>
+            </a:prstGeom>
+          </p:spPr>
+        </p:pic>
+        <p:sp>
+          <p:nvSpPr>
+            <p:cNvPr id="16" name="TextBox 15">
+              <a:extLst>
+                <a:ext uri="{FF2B5EF4-FFF2-40B4-BE49-F238E27FC236}">
+                  <a16:creationId xmlns:a16="http://schemas.microsoft.com/office/drawing/2014/main" id="{ED04334E-B353-8CC0-1916-BEA8E4E40563}"/>
+                </a:ext>
+              </a:extLst>
+            </p:cNvPr>
+            <p:cNvSpPr txBox="1"/>
+            <p:nvPr/>
+          </p:nvSpPr>
+          <p:spPr>
+            <a:xfrm>
+              <a:off x="8035811" y="3340417"/>
+              <a:ext cx="389850" cy="369332"/>
+            </a:xfrm>
+            <a:prstGeom prst="rect">
+              <a:avLst/>
+            </a:prstGeom>
+            <a:noFill/>
+          </p:spPr>
+          <p:txBody>
+            <a:bodyPr wrap="none" rtlCol="0">
+              <a:spAutoFit/>
+            </a:bodyPr>
+            <a:lstStyle/>
+            <a:p>
+              <a:r>
+                <a:rPr lang="en-CA" b="1" dirty="0">
+                  <a:latin typeface="Helvetica" panose="020B0604020202020204" pitchFamily="34" charset="0"/>
+                  <a:cs typeface="Helvetica" panose="020B0604020202020204" pitchFamily="34" charset="0"/>
+                </a:rPr>
+                <a:t>e)</a:t>
+              </a:r>
+            </a:p>
+          </p:txBody>
+        </p:sp>
+        <p:sp>
+          <p:nvSpPr>
+            <p:cNvPr id="17" name="TextBox 16">
+              <a:extLst>
+                <a:ext uri="{FF2B5EF4-FFF2-40B4-BE49-F238E27FC236}">
+                  <a16:creationId xmlns:a16="http://schemas.microsoft.com/office/drawing/2014/main" id="{D5F0E2AF-DE19-5C5B-9F0F-10463EB0C57B}"/>
+                </a:ext>
+              </a:extLst>
+            </p:cNvPr>
+            <p:cNvSpPr txBox="1"/>
+            <p:nvPr/>
+          </p:nvSpPr>
+          <p:spPr>
+            <a:xfrm>
+              <a:off x="9096962" y="6550386"/>
+              <a:ext cx="722725" cy="307777"/>
+            </a:xfrm>
+            <a:prstGeom prst="rect">
+              <a:avLst/>
+            </a:prstGeom>
+            <a:noFill/>
+          </p:spPr>
+          <p:txBody>
+            <a:bodyPr wrap="square" rtlCol="0">
+              <a:spAutoFit/>
+            </a:bodyPr>
+            <a:lstStyle/>
+            <a:p>
+              <a:r>
+                <a:rPr lang="en-CA" sz="1400" dirty="0">
+                  <a:latin typeface="Helvetica" panose="020B0604020202020204" pitchFamily="34" charset="0"/>
+                  <a:cs typeface="Helvetica" panose="020B0604020202020204" pitchFamily="34" charset="0"/>
+                </a:rPr>
+                <a:t>Day 1</a:t>
+              </a:r>
+            </a:p>
+          </p:txBody>
+        </p:sp>
+        <p:sp>
+          <p:nvSpPr>
+            <p:cNvPr id="18" name="TextBox 17">
+              <a:extLst>
+                <a:ext uri="{FF2B5EF4-FFF2-40B4-BE49-F238E27FC236}">
+                  <a16:creationId xmlns:a16="http://schemas.microsoft.com/office/drawing/2014/main" id="{888CF6E9-0095-F8E2-6573-779EB8326AA5}"/>
+                </a:ext>
+              </a:extLst>
+            </p:cNvPr>
+            <p:cNvSpPr txBox="1"/>
+            <p:nvPr/>
+          </p:nvSpPr>
+          <p:spPr>
+            <a:xfrm>
+              <a:off x="10040390" y="6559511"/>
+              <a:ext cx="722725" cy="307777"/>
+            </a:xfrm>
+            <a:prstGeom prst="rect">
+              <a:avLst/>
+            </a:prstGeom>
+            <a:noFill/>
+          </p:spPr>
+          <p:txBody>
+            <a:bodyPr wrap="square" rtlCol="0">
+              <a:spAutoFit/>
+            </a:bodyPr>
+            <a:lstStyle/>
+            <a:p>
+              <a:r>
+                <a:rPr lang="en-CA" sz="1400" dirty="0">
+                  <a:latin typeface="Helvetica" panose="020B0604020202020204" pitchFamily="34" charset="0"/>
+                  <a:cs typeface="Helvetica" panose="020B0604020202020204" pitchFamily="34" charset="0"/>
+                </a:rPr>
+                <a:t>Day 2</a:t>
+              </a:r>
+            </a:p>
+          </p:txBody>
+        </p:sp>
+      </p:grpSp>
+      <p:pic>
+        <p:nvPicPr>
+          <p:cNvPr id="21" name="Picture 20">
+            <a:extLst>
+              <a:ext uri="{FF2B5EF4-FFF2-40B4-BE49-F238E27FC236}">
+                <a16:creationId xmlns:a16="http://schemas.microsoft.com/office/drawing/2014/main" id="{C6CB8E16-39A0-E637-AF56-7F056C4B4E76}"/>
+              </a:ext>
+            </a:extLst>
+          </p:cNvPr>
+          <p:cNvPicPr>
+            <a:picLocks noChangeAspect="1"/>
+          </p:cNvPicPr>
+          <p:nvPr/>
+        </p:nvPicPr>
+        <p:blipFill>
+          <a:blip r:embed="rId9"/>
+          <a:stretch>
+            <a:fillRect/>
+          </a:stretch>
+        </p:blipFill>
+        <p:spPr>
+          <a:xfrm>
+            <a:off x="8852970" y="95575"/>
+            <a:ext cx="1635414" cy="327083"/>
+          </a:xfrm>
+          <a:prstGeom prst="rect">
+            <a:avLst/>
+          </a:prstGeom>
+        </p:spPr>
+      </p:pic>
+      <p:pic>
+        <p:nvPicPr>
+          <p:cNvPr id="25" name="Picture 24">
+            <a:extLst>
+              <a:ext uri="{FF2B5EF4-FFF2-40B4-BE49-F238E27FC236}">
+                <a16:creationId xmlns:a16="http://schemas.microsoft.com/office/drawing/2014/main" id="{8600770E-B6CD-3569-3DAF-38807BEF02D5}"/>
+              </a:ext>
+            </a:extLst>
+          </p:cNvPr>
+          <p:cNvPicPr>
+            <a:picLocks noChangeAspect="1"/>
+          </p:cNvPicPr>
+          <p:nvPr/>
+        </p:nvPicPr>
+        <p:blipFill>
+          <a:blip r:embed="rId10"/>
+          <a:stretch>
+            <a:fillRect/>
+          </a:stretch>
+        </p:blipFill>
+        <p:spPr>
+          <a:xfrm>
+            <a:off x="6181309" y="3549435"/>
+            <a:ext cx="600916" cy="280783"/>
+          </a:xfrm>
+          <a:prstGeom prst="rect">
+            <a:avLst/>
+          </a:prstGeom>
+        </p:spPr>
+      </p:pic>
+      <p:pic>
+        <p:nvPicPr>
+          <p:cNvPr id="27" name="Picture 26">
+            <a:extLst>
+              <a:ext uri="{FF2B5EF4-FFF2-40B4-BE49-F238E27FC236}">
+                <a16:creationId xmlns:a16="http://schemas.microsoft.com/office/drawing/2014/main" id="{3D7763CD-DF82-C572-0A6B-13000E9CC9CE}"/>
+              </a:ext>
+            </a:extLst>
+          </p:cNvPr>
+          <p:cNvPicPr>
+            <a:picLocks noChangeAspect="1"/>
+          </p:cNvPicPr>
+          <p:nvPr/>
+        </p:nvPicPr>
+        <p:blipFill>
+          <a:blip r:embed="rId11"/>
+          <a:stretch>
+            <a:fillRect/>
+          </a:stretch>
+        </p:blipFill>
+        <p:spPr>
+          <a:xfrm>
+            <a:off x="6986478" y="3564113"/>
+            <a:ext cx="514723" cy="275111"/>
+          </a:xfrm>
+          <a:prstGeom prst="rect">
+            <a:avLst/>
+          </a:prstGeom>
+        </p:spPr>
+      </p:pic>
     </p:spTree>
     <p:extLst>
       <p:ext uri="{BB962C8B-B14F-4D97-AF65-F5344CB8AC3E}">
-        <p14:creationId xmlns:p14="http://schemas.microsoft.com/office/powerpoint/2010/main" val="3355789389"/>
+        <p14:creationId xmlns:p14="http://schemas.microsoft.com/office/powerpoint/2010/main" val="3605660557"/>
       </p:ext>
     </p:extLst>
   </p:cSld>

</xml_diff>

<commit_message>
Hopefully the finalized scripts for all analyses.
</commit_message>
<xml_diff>
--- a/soc_exp_ms_figs.pptx
+++ b/soc_exp_ms_figs.pptx
@@ -132,28 +132,6 @@
 </p188:authorLst>
 </file>
 
-<file path=ppt/comments/modernComment_105_6998141D.xml><?xml version="1.0" encoding="utf-8"?>
-<p188:cmLst xmlns:a="http://schemas.openxmlformats.org/drawingml/2006/main" xmlns:r="http://schemas.openxmlformats.org/officeDocument/2006/relationships" xmlns:p188="http://schemas.microsoft.com/office/powerpoint/2018/8/main">
-  <p188:cm id="{DFC53996-961B-47F3-B79F-B8A5723F6C01}" authorId="{2E8574E9-E633-1102-D2B2-45499FAE846B}" created="2024-02-13T03:41:39.065">
-    <ac:deMkLst xmlns:ac="http://schemas.microsoft.com/office/drawing/2013/main/command">
-      <pc:docMk xmlns:pc="http://schemas.microsoft.com/office/powerpoint/2013/main/command"/>
-      <pc:sldMk xmlns:pc="http://schemas.microsoft.com/office/powerpoint/2013/main/command" cId="1771574301" sldId="261"/>
-      <ac:picMk id="10" creationId="{DDB69BEA-FDDB-76A0-2B2E-AA83990F51ED}"/>
-    </ac:deMkLst>
-    <p188:txBody>
-      <a:bodyPr/>
-      <a:lstStyle/>
-      <a:p>
-        <a:r>
-          <a:rPr lang="en-CA"/>
-          <a:t>This doesn't look right but I'm not sure how to show that the main effect of treatment here is significant</a:t>
-        </a:r>
-      </a:p>
-    </p188:txBody>
-  </p188:cm>
-</p188:cmLst>
-</file>
-
 <file path=ppt/slideLayouts/slideLayout1.xml><?xml version="1.0" encoding="utf-8"?>
 <p:sldLayout xmlns:a="http://schemas.openxmlformats.org/drawingml/2006/main" xmlns:r="http://schemas.openxmlformats.org/officeDocument/2006/relationships" xmlns:p="http://schemas.openxmlformats.org/presentationml/2006/main" type="title" preserve="1">
   <p:cSld name="Title Slide">
@@ -303,7 +281,7 @@
           <a:p>
             <a:fld id="{65368BD6-7643-4418-A51B-0F021EBB43CE}" type="datetimeFigureOut">
               <a:rPr lang="en-CA" smtClean="0"/>
-              <a:t>2024-02-12</a:t>
+              <a:t>2024-02-13</a:t>
             </a:fld>
             <a:endParaRPr lang="en-CA"/>
           </a:p>
@@ -503,7 +481,7 @@
           <a:p>
             <a:fld id="{65368BD6-7643-4418-A51B-0F021EBB43CE}" type="datetimeFigureOut">
               <a:rPr lang="en-CA" smtClean="0"/>
-              <a:t>2024-02-12</a:t>
+              <a:t>2024-02-13</a:t>
             </a:fld>
             <a:endParaRPr lang="en-CA"/>
           </a:p>
@@ -713,7 +691,7 @@
           <a:p>
             <a:fld id="{65368BD6-7643-4418-A51B-0F021EBB43CE}" type="datetimeFigureOut">
               <a:rPr lang="en-CA" smtClean="0"/>
-              <a:t>2024-02-12</a:t>
+              <a:t>2024-02-13</a:t>
             </a:fld>
             <a:endParaRPr lang="en-CA"/>
           </a:p>
@@ -913,7 +891,7 @@
           <a:p>
             <a:fld id="{65368BD6-7643-4418-A51B-0F021EBB43CE}" type="datetimeFigureOut">
               <a:rPr lang="en-CA" smtClean="0"/>
-              <a:t>2024-02-12</a:t>
+              <a:t>2024-02-13</a:t>
             </a:fld>
             <a:endParaRPr lang="en-CA"/>
           </a:p>
@@ -1189,7 +1167,7 @@
           <a:p>
             <a:fld id="{65368BD6-7643-4418-A51B-0F021EBB43CE}" type="datetimeFigureOut">
               <a:rPr lang="en-CA" smtClean="0"/>
-              <a:t>2024-02-12</a:t>
+              <a:t>2024-02-13</a:t>
             </a:fld>
             <a:endParaRPr lang="en-CA"/>
           </a:p>
@@ -1457,7 +1435,7 @@
           <a:p>
             <a:fld id="{65368BD6-7643-4418-A51B-0F021EBB43CE}" type="datetimeFigureOut">
               <a:rPr lang="en-CA" smtClean="0"/>
-              <a:t>2024-02-12</a:t>
+              <a:t>2024-02-13</a:t>
             </a:fld>
             <a:endParaRPr lang="en-CA"/>
           </a:p>
@@ -1872,7 +1850,7 @@
           <a:p>
             <a:fld id="{65368BD6-7643-4418-A51B-0F021EBB43CE}" type="datetimeFigureOut">
               <a:rPr lang="en-CA" smtClean="0"/>
-              <a:t>2024-02-12</a:t>
+              <a:t>2024-02-13</a:t>
             </a:fld>
             <a:endParaRPr lang="en-CA"/>
           </a:p>
@@ -2014,7 +1992,7 @@
           <a:p>
             <a:fld id="{65368BD6-7643-4418-A51B-0F021EBB43CE}" type="datetimeFigureOut">
               <a:rPr lang="en-CA" smtClean="0"/>
-              <a:t>2024-02-12</a:t>
+              <a:t>2024-02-13</a:t>
             </a:fld>
             <a:endParaRPr lang="en-CA"/>
           </a:p>
@@ -2127,7 +2105,7 @@
           <a:p>
             <a:fld id="{65368BD6-7643-4418-A51B-0F021EBB43CE}" type="datetimeFigureOut">
               <a:rPr lang="en-CA" smtClean="0"/>
-              <a:t>2024-02-12</a:t>
+              <a:t>2024-02-13</a:t>
             </a:fld>
             <a:endParaRPr lang="en-CA"/>
           </a:p>
@@ -2440,7 +2418,7 @@
           <a:p>
             <a:fld id="{65368BD6-7643-4418-A51B-0F021EBB43CE}" type="datetimeFigureOut">
               <a:rPr lang="en-CA" smtClean="0"/>
-              <a:t>2024-02-12</a:t>
+              <a:t>2024-02-13</a:t>
             </a:fld>
             <a:endParaRPr lang="en-CA"/>
           </a:p>
@@ -2729,7 +2707,7 @@
           <a:p>
             <a:fld id="{65368BD6-7643-4418-A51B-0F021EBB43CE}" type="datetimeFigureOut">
               <a:rPr lang="en-CA" smtClean="0"/>
-              <a:t>2024-02-12</a:t>
+              <a:t>2024-02-13</a:t>
             </a:fld>
             <a:endParaRPr lang="en-CA"/>
           </a:p>
@@ -2972,7 +2950,7 @@
           <a:p>
             <a:fld id="{65368BD6-7643-4418-A51B-0F021EBB43CE}" type="datetimeFigureOut">
               <a:rPr lang="en-CA" smtClean="0"/>
-              <a:t>2024-02-12</a:t>
+              <a:t>2024-02-13</a:t>
             </a:fld>
             <a:endParaRPr lang="en-CA"/>
           </a:p>
@@ -13007,6 +12985,36 @@
           <p:nvPr/>
         </p:nvPicPr>
         <p:blipFill>
+          <a:blip r:embed="rId2"/>
+          <a:stretch>
+            <a:fillRect/>
+          </a:stretch>
+        </p:blipFill>
+        <p:spPr>
+          <a:xfrm>
+            <a:off x="2169117" y="3683359"/>
+            <a:ext cx="2472787" cy="2996261"/>
+          </a:xfrm>
+          <a:prstGeom prst="rect">
+            <a:avLst/>
+          </a:prstGeom>
+        </p:spPr>
+      </p:pic>
+      <p:pic>
+        <p:nvPicPr>
+          <p:cNvPr id="7" name="Picture 6">
+            <a:extLst>
+              <a:ext uri="{FF2B5EF4-FFF2-40B4-BE49-F238E27FC236}">
+                <a16:creationId xmlns:a16="http://schemas.microsoft.com/office/drawing/2014/main" id="{092DC6FB-70E5-4184-68C2-5DAE04555E98}"/>
+              </a:ext>
+            </a:extLst>
+          </p:cNvPr>
+          <p:cNvPicPr>
+            <a:picLocks noChangeAspect="1"/>
+          </p:cNvPicPr>
+          <p:nvPr/>
+        </p:nvPicPr>
+        <p:blipFill>
           <a:blip r:embed="rId3"/>
           <a:stretch>
             <a:fillRect/>
@@ -13014,36 +13022,6 @@
         </p:blipFill>
         <p:spPr>
           <a:xfrm>
-            <a:off x="2169117" y="3683359"/>
-            <a:ext cx="2472787" cy="2996261"/>
-          </a:xfrm>
-          <a:prstGeom prst="rect">
-            <a:avLst/>
-          </a:prstGeom>
-        </p:spPr>
-      </p:pic>
-      <p:pic>
-        <p:nvPicPr>
-          <p:cNvPr id="7" name="Picture 6">
-            <a:extLst>
-              <a:ext uri="{FF2B5EF4-FFF2-40B4-BE49-F238E27FC236}">
-                <a16:creationId xmlns:a16="http://schemas.microsoft.com/office/drawing/2014/main" id="{092DC6FB-70E5-4184-68C2-5DAE04555E98}"/>
-              </a:ext>
-            </a:extLst>
-          </p:cNvPr>
-          <p:cNvPicPr>
-            <a:picLocks noChangeAspect="1"/>
-          </p:cNvPicPr>
-          <p:nvPr/>
-        </p:nvPicPr>
-        <p:blipFill>
-          <a:blip r:embed="rId4"/>
-          <a:stretch>
-            <a:fillRect/>
-          </a:stretch>
-        </p:blipFill>
-        <p:spPr>
-          <a:xfrm>
             <a:off x="4590478" y="362490"/>
             <a:ext cx="2547230" cy="3082148"/>
           </a:xfrm>
@@ -13067,7 +13045,7 @@
           <p:nvPr/>
         </p:nvPicPr>
         <p:blipFill>
-          <a:blip r:embed="rId5"/>
+          <a:blip r:embed="rId4"/>
           <a:stretch>
             <a:fillRect/>
           </a:stretch>
@@ -13423,7 +13401,7 @@
             <p:nvPr/>
           </p:nvPicPr>
           <p:blipFill rotWithShape="1">
-            <a:blip r:embed="rId6"/>
+            <a:blip r:embed="rId5"/>
             <a:srcRect l="3021" t="1714" r="3955" b="1896"/>
             <a:stretch/>
           </p:blipFill>
@@ -13452,7 +13430,7 @@
             <p:nvPr/>
           </p:nvPicPr>
           <p:blipFill>
-            <a:blip r:embed="rId7"/>
+            <a:blip r:embed="rId6"/>
             <a:stretch>
               <a:fillRect/>
             </a:stretch>
@@ -13571,7 +13549,7 @@
           <p:nvPr/>
         </p:nvPicPr>
         <p:blipFill rotWithShape="1">
-          <a:blip r:embed="rId8"/>
+          <a:blip r:embed="rId7"/>
           <a:srcRect b="6319"/>
           <a:stretch/>
         </p:blipFill>
@@ -13732,7 +13710,7 @@
           <p:nvPr/>
         </p:nvPicPr>
         <p:blipFill>
-          <a:blip r:embed="rId7"/>
+          <a:blip r:embed="rId6"/>
           <a:stretch>
             <a:fillRect/>
           </a:stretch>
@@ -13762,7 +13740,7 @@
           <p:nvPr/>
         </p:nvPicPr>
         <p:blipFill>
-          <a:blip r:embed="rId7"/>
+          <a:blip r:embed="rId6"/>
           <a:stretch>
             <a:fillRect/>
           </a:stretch>
@@ -13855,10 +13833,10 @@
       </p:sp>
       <p:pic>
         <p:nvPicPr>
-          <p:cNvPr id="111" name="Picture 110">
-            <a:extLst>
-              <a:ext uri="{FF2B5EF4-FFF2-40B4-BE49-F238E27FC236}">
-                <a16:creationId xmlns:a16="http://schemas.microsoft.com/office/drawing/2014/main" id="{EFA4D1EF-FB5B-09D3-92BE-C91C6E504959}"/>
+          <p:cNvPr id="9" name="Picture 8">
+            <a:extLst>
+              <a:ext uri="{FF2B5EF4-FFF2-40B4-BE49-F238E27FC236}">
+                <a16:creationId xmlns:a16="http://schemas.microsoft.com/office/drawing/2014/main" id="{043ED43C-7368-F7DB-E7CE-E4023ADD1689}"/>
               </a:ext>
             </a:extLst>
           </p:cNvPr>
@@ -13867,15 +13845,16 @@
           </p:cNvPicPr>
           <p:nvPr/>
         </p:nvPicPr>
-        <p:blipFill rotWithShape="1">
-          <a:blip r:embed="rId7"/>
-          <a:srcRect t="47827"/>
-          <a:stretch/>
+        <p:blipFill>
+          <a:blip r:embed="rId8"/>
+          <a:stretch>
+            <a:fillRect/>
+          </a:stretch>
         </p:blipFill>
         <p:spPr>
           <a:xfrm>
-            <a:off x="8484976" y="1000523"/>
-            <a:ext cx="1260509" cy="155965"/>
+            <a:off x="8141688" y="217726"/>
+            <a:ext cx="514422" cy="304843"/>
           </a:xfrm>
           <a:prstGeom prst="rect">
             <a:avLst/>
@@ -13884,10 +13863,10 @@
       </p:pic>
       <p:pic>
         <p:nvPicPr>
-          <p:cNvPr id="116" name="Picture 115">
-            <a:extLst>
-              <a:ext uri="{FF2B5EF4-FFF2-40B4-BE49-F238E27FC236}">
-                <a16:creationId xmlns:a16="http://schemas.microsoft.com/office/drawing/2014/main" id="{BB07EDCF-B703-6D8F-3A67-A907ED815735}"/>
+          <p:cNvPr id="15" name="Picture 14">
+            <a:extLst>
+              <a:ext uri="{FF2B5EF4-FFF2-40B4-BE49-F238E27FC236}">
+                <a16:creationId xmlns:a16="http://schemas.microsoft.com/office/drawing/2014/main" id="{DCC5D9FA-5608-9A28-61A5-44EFF38C8C79}"/>
               </a:ext>
             </a:extLst>
           </p:cNvPr>
@@ -13896,176 +13875,22 @@
           </p:cNvPicPr>
           <p:nvPr/>
         </p:nvPicPr>
-        <p:blipFill rotWithShape="1">
-          <a:blip r:embed="rId7"/>
-          <a:srcRect t="47827"/>
-          <a:stretch/>
+        <p:blipFill>
+          <a:blip r:embed="rId8"/>
+          <a:stretch>
+            <a:fillRect/>
+          </a:stretch>
         </p:blipFill>
         <p:spPr>
           <a:xfrm>
-            <a:off x="8132452" y="454853"/>
-            <a:ext cx="1128125" cy="128345"/>
+            <a:off x="9117153" y="219630"/>
+            <a:ext cx="514422" cy="304843"/>
           </a:xfrm>
           <a:prstGeom prst="rect">
             <a:avLst/>
           </a:prstGeom>
         </p:spPr>
       </p:pic>
-      <p:cxnSp>
-        <p:nvCxnSpPr>
-          <p:cNvPr id="133" name="Straight Connector 132">
-            <a:extLst>
-              <a:ext uri="{FF2B5EF4-FFF2-40B4-BE49-F238E27FC236}">
-                <a16:creationId xmlns:a16="http://schemas.microsoft.com/office/drawing/2014/main" id="{ABDF116F-8E54-897A-FB0F-944BA27D4742}"/>
-              </a:ext>
-            </a:extLst>
-          </p:cNvPr>
-          <p:cNvCxnSpPr>
-            <a:cxnSpLocks/>
-          </p:cNvCxnSpPr>
-          <p:nvPr/>
-        </p:nvCxnSpPr>
-        <p:spPr>
-          <a:xfrm>
-            <a:off x="9226073" y="356140"/>
-            <a:ext cx="0" cy="663911"/>
-          </a:xfrm>
-          <a:prstGeom prst="line">
-            <a:avLst/>
-          </a:prstGeom>
-          <a:ln w="19050"/>
-        </p:spPr>
-        <p:style>
-          <a:lnRef idx="1">
-            <a:schemeClr val="dk1"/>
-          </a:lnRef>
-          <a:fillRef idx="0">
-            <a:schemeClr val="dk1"/>
-          </a:fillRef>
-          <a:effectRef idx="0">
-            <a:schemeClr val="dk1"/>
-          </a:effectRef>
-          <a:fontRef idx="minor">
-            <a:schemeClr val="tx1"/>
-          </a:fontRef>
-        </p:style>
-      </p:cxnSp>
-      <p:cxnSp>
-        <p:nvCxnSpPr>
-          <p:cNvPr id="135" name="Straight Connector 134">
-            <a:extLst>
-              <a:ext uri="{FF2B5EF4-FFF2-40B4-BE49-F238E27FC236}">
-                <a16:creationId xmlns:a16="http://schemas.microsoft.com/office/drawing/2014/main" id="{B9F391D3-038B-81D6-7B00-8B1A8AD9F1EA}"/>
-              </a:ext>
-            </a:extLst>
-          </p:cNvPr>
-          <p:cNvCxnSpPr>
-            <a:cxnSpLocks/>
-          </p:cNvCxnSpPr>
-          <p:nvPr/>
-        </p:nvCxnSpPr>
-        <p:spPr>
-          <a:xfrm>
-            <a:off x="8629906" y="353864"/>
-            <a:ext cx="596167" cy="0"/>
-          </a:xfrm>
-          <a:prstGeom prst="line">
-            <a:avLst/>
-          </a:prstGeom>
-          <a:ln w="19050"/>
-        </p:spPr>
-        <p:style>
-          <a:lnRef idx="1">
-            <a:schemeClr val="dk1"/>
-          </a:lnRef>
-          <a:fillRef idx="0">
-            <a:schemeClr val="dk1"/>
-          </a:fillRef>
-          <a:effectRef idx="0">
-            <a:schemeClr val="dk1"/>
-          </a:effectRef>
-          <a:fontRef idx="minor">
-            <a:schemeClr val="tx1"/>
-          </a:fontRef>
-        </p:style>
-      </p:cxnSp>
-      <p:cxnSp>
-        <p:nvCxnSpPr>
-          <p:cNvPr id="138" name="Straight Connector 137">
-            <a:extLst>
-              <a:ext uri="{FF2B5EF4-FFF2-40B4-BE49-F238E27FC236}">
-                <a16:creationId xmlns:a16="http://schemas.microsoft.com/office/drawing/2014/main" id="{CA4F44C0-FDB0-3A9D-4714-C37AC6D2157E}"/>
-              </a:ext>
-            </a:extLst>
-          </p:cNvPr>
-          <p:cNvCxnSpPr>
-            <a:cxnSpLocks/>
-          </p:cNvCxnSpPr>
-          <p:nvPr/>
-        </p:nvCxnSpPr>
-        <p:spPr>
-          <a:xfrm>
-            <a:off x="8629906" y="347514"/>
-            <a:ext cx="0" cy="118241"/>
-          </a:xfrm>
-          <a:prstGeom prst="line">
-            <a:avLst/>
-          </a:prstGeom>
-          <a:ln w="19050"/>
-        </p:spPr>
-        <p:style>
-          <a:lnRef idx="1">
-            <a:schemeClr val="dk1"/>
-          </a:lnRef>
-          <a:fillRef idx="0">
-            <a:schemeClr val="dk1"/>
-          </a:fillRef>
-          <a:effectRef idx="0">
-            <a:schemeClr val="dk1"/>
-          </a:effectRef>
-          <a:fontRef idx="minor">
-            <a:schemeClr val="tx1"/>
-          </a:fontRef>
-        </p:style>
-      </p:cxnSp>
-      <p:sp>
-        <p:nvSpPr>
-          <p:cNvPr id="151" name="TextBox 150">
-            <a:extLst>
-              <a:ext uri="{FF2B5EF4-FFF2-40B4-BE49-F238E27FC236}">
-                <a16:creationId xmlns:a16="http://schemas.microsoft.com/office/drawing/2014/main" id="{0590DF01-A277-7BD7-3042-7325346B89DD}"/>
-              </a:ext>
-            </a:extLst>
-          </p:cNvPr>
-          <p:cNvSpPr txBox="1"/>
-          <p:nvPr/>
-        </p:nvSpPr>
-        <p:spPr>
-          <a:xfrm>
-            <a:off x="8753867" y="136637"/>
-            <a:ext cx="722725" cy="307777"/>
-          </a:xfrm>
-          <a:prstGeom prst="rect">
-            <a:avLst/>
-          </a:prstGeom>
-          <a:noFill/>
-        </p:spPr>
-        <p:txBody>
-          <a:bodyPr wrap="square" rtlCol="0">
-            <a:spAutoFit/>
-          </a:bodyPr>
-          <a:lstStyle/>
-          <a:p>
-            <a:r>
-              <a:rPr lang="en-CA" sz="1400" dirty="0">
-                <a:latin typeface="Helvetica" panose="020B0604020202020204" pitchFamily="34" charset="0"/>
-                <a:cs typeface="Helvetica" panose="020B0604020202020204" pitchFamily="34" charset="0"/>
-              </a:rPr>
-              <a:t>**</a:t>
-            </a:r>
-          </a:p>
-        </p:txBody>
-      </p:sp>
     </p:spTree>
     <p:extLst>
       <p:ext uri="{BB962C8B-B14F-4D97-AF65-F5344CB8AC3E}">
@@ -14076,11 +13901,6 @@
   <p:clrMapOvr>
     <a:masterClrMapping/>
   </p:clrMapOvr>
-  <p:extLst>
-    <p:ext uri="{6950BFC3-D8DA-4A85-94F7-54DA5524770B}">
-      <p188:commentRel xmlns:p188="http://schemas.microsoft.com/office/powerpoint/2018/8/main" r:id="rId2"/>
-    </p:ext>
-  </p:extLst>
 </p:sld>
 </file>
 

</xml_diff>